<commit_message>
new version of poster uploaded
</commit_message>
<xml_diff>
--- a/presentations/poster_clex_workshop_maurice_huguenin_2019.pptx
+++ b/presentations/poster_clex_workshop_maurice_huguenin_2019.pptx
@@ -2,16 +2,16 @@
 <file path=ppt/presentation.xml><?xml version="1.0" encoding="utf-8"?>
 <p:presentation xmlns:a="http://schemas.openxmlformats.org/drawingml/2006/main" xmlns:r="http://schemas.openxmlformats.org/officeDocument/2006/relationships" xmlns:p="http://schemas.openxmlformats.org/presentationml/2006/main" saveSubsetFonts="1">
   <p:sldMasterIdLst>
-    <p:sldMasterId id="2147483672" r:id="rId1"/>
+    <p:sldMasterId id="2147483672" r:id="rId4"/>
   </p:sldMasterIdLst>
   <p:notesMasterIdLst>
-    <p:notesMasterId r:id="rId3"/>
+    <p:notesMasterId r:id="rId6"/>
   </p:notesMasterIdLst>
   <p:handoutMasterIdLst>
-    <p:handoutMasterId r:id="rId4"/>
+    <p:handoutMasterId r:id="rId7"/>
   </p:handoutMasterIdLst>
   <p:sldIdLst>
-    <p:sldId id="256" r:id="rId2"/>
+    <p:sldId id="256" r:id="rId5"/>
   </p:sldIdLst>
   <p:sldSz cx="30275213" cy="42803763"/>
   <p:notesSz cx="7315200" cy="9601200"/>
@@ -211,7 +211,7 @@
           <a:p>
             <a:fld id="{D60A1517-57FD-4E08-9190-27AEEFFFA986}" type="datetimeFigureOut">
               <a:rPr lang="en-US" smtClean="0"/>
-              <a:t>11/12/2019</a:t>
+              <a:t>11/13/2019</a:t>
             </a:fld>
             <a:endParaRPr lang="en-US"/>
           </a:p>
@@ -292,6 +292,60 @@
   </p:cSld>
   <p:clrMap bg1="lt1" tx1="dk1" bg2="lt2" tx2="dk2" accent1="accent1" accent2="accent2" accent3="accent3" accent4="accent4" accent5="accent5" accent6="accent6" hlink="hlink" folHlink="folHlink"/>
 </p:handoutMaster>
+</file>
+
+<file path=ppt/ink/ink1.xml><?xml version="1.0" encoding="utf-8"?>
+<inkml:ink xmlns:inkml="http://www.w3.org/2003/InkML">
+  <inkml:definitions>
+    <inkml:context xml:id="ctx0">
+      <inkml:inkSource xml:id="inkSrc0">
+        <inkml:traceFormat>
+          <inkml:channel name="X" type="integer" min="-2.14748E9" max="2.14748E9" units="cm"/>
+          <inkml:channel name="Y" type="integer" min="-2.14748E9" max="2.14748E9" units="cm"/>
+          <inkml:channel name="F" type="integer" max="32767" units="dev"/>
+        </inkml:traceFormat>
+        <inkml:channelProperties>
+          <inkml:channelProperty channel="X" name="resolution" value="1000" units="1/cm"/>
+          <inkml:channelProperty channel="Y" name="resolution" value="1000" units="1/cm"/>
+          <inkml:channelProperty channel="F" name="resolution" value="0" units="1/dev"/>
+        </inkml:channelProperties>
+      </inkml:inkSource>
+      <inkml:timestamp xml:id="ts0" timeString="2019-11-13T03:55:11.135"/>
+    </inkml:context>
+    <inkml:brush xml:id="br0">
+      <inkml:brushProperty name="width" value="0.05" units="cm"/>
+      <inkml:brushProperty name="height" value="0.05" units="cm"/>
+    </inkml:brush>
+  </inkml:definitions>
+  <inkml:trace contextRef="#ctx0" brushRef="#br0">1 1 4</inkml:trace>
+</inkml:ink>
+</file>
+
+<file path=ppt/ink/ink2.xml><?xml version="1.0" encoding="utf-8"?>
+<inkml:ink xmlns:inkml="http://www.w3.org/2003/InkML">
+  <inkml:definitions>
+    <inkml:context xml:id="ctx0">
+      <inkml:inkSource xml:id="inkSrc0">
+        <inkml:traceFormat>
+          <inkml:channel name="X" type="integer" min="-2.14748E9" max="2.14748E9" units="cm"/>
+          <inkml:channel name="Y" type="integer" min="-2.14748E9" max="2.14748E9" units="cm"/>
+          <inkml:channel name="F" type="integer" max="32767" units="dev"/>
+        </inkml:traceFormat>
+        <inkml:channelProperties>
+          <inkml:channelProperty channel="X" name="resolution" value="1000" units="1/cm"/>
+          <inkml:channelProperty channel="Y" name="resolution" value="1000" units="1/cm"/>
+          <inkml:channelProperty channel="F" name="resolution" value="0" units="1/dev"/>
+        </inkml:channelProperties>
+      </inkml:inkSource>
+      <inkml:timestamp xml:id="ts0" timeString="2019-11-13T03:57:13.752"/>
+    </inkml:context>
+    <inkml:brush xml:id="br0">
+      <inkml:brushProperty name="width" value="0.05" units="cm"/>
+      <inkml:brushProperty name="height" value="0.05" units="cm"/>
+    </inkml:brush>
+  </inkml:definitions>
+  <inkml:trace contextRef="#ctx0" brushRef="#br0">1 703 4,'372'-185'0,"653"-333"0</inkml:trace>
+</inkml:ink>
 </file>
 
 <file path=ppt/notesMasters/notesMaster1.xml><?xml version="1.0" encoding="utf-8"?>
@@ -376,7 +430,7 @@
           <a:p>
             <a:fld id="{FE88F1A9-1491-4A4B-9B77-13A01D10A0FF}" type="datetimeFigureOut">
               <a:rPr lang="en-US" smtClean="0"/>
-              <a:t>11/12/2019</a:t>
+              <a:t>11/13/2019</a:t>
             </a:fld>
             <a:endParaRPr lang="en-US"/>
           </a:p>
@@ -863,7 +917,7 @@
           <a:p>
             <a:fld id="{819FB65F-77A9-44EE-854A-5630BF17D415}" type="datetimeFigureOut">
               <a:rPr lang="en-US" smtClean="0"/>
-              <a:t>11/12/2019</a:t>
+              <a:t>11/13/2019</a:t>
             </a:fld>
             <a:endParaRPr lang="en-US"/>
           </a:p>
@@ -1033,7 +1087,7 @@
           <a:p>
             <a:fld id="{819FB65F-77A9-44EE-854A-5630BF17D415}" type="datetimeFigureOut">
               <a:rPr lang="en-US" smtClean="0"/>
-              <a:t>11/12/2019</a:t>
+              <a:t>11/13/2019</a:t>
             </a:fld>
             <a:endParaRPr lang="en-US"/>
           </a:p>
@@ -1213,7 +1267,7 @@
           <a:p>
             <a:fld id="{819FB65F-77A9-44EE-854A-5630BF17D415}" type="datetimeFigureOut">
               <a:rPr lang="en-US" smtClean="0"/>
-              <a:t>11/12/2019</a:t>
+              <a:t>11/13/2019</a:t>
             </a:fld>
             <a:endParaRPr lang="en-US"/>
           </a:p>
@@ -1383,7 +1437,7 @@
           <a:p>
             <a:fld id="{819FB65F-77A9-44EE-854A-5630BF17D415}" type="datetimeFigureOut">
               <a:rPr lang="en-US" smtClean="0"/>
-              <a:t>11/12/2019</a:t>
+              <a:t>11/13/2019</a:t>
             </a:fld>
             <a:endParaRPr lang="en-US"/>
           </a:p>
@@ -1627,7 +1681,7 @@
           <a:p>
             <a:fld id="{819FB65F-77A9-44EE-854A-5630BF17D415}" type="datetimeFigureOut">
               <a:rPr lang="en-US" smtClean="0"/>
-              <a:t>11/12/2019</a:t>
+              <a:t>11/13/2019</a:t>
             </a:fld>
             <a:endParaRPr lang="en-US"/>
           </a:p>
@@ -1859,7 +1913,7 @@
           <a:p>
             <a:fld id="{819FB65F-77A9-44EE-854A-5630BF17D415}" type="datetimeFigureOut">
               <a:rPr lang="en-US" smtClean="0"/>
-              <a:t>11/12/2019</a:t>
+              <a:t>11/13/2019</a:t>
             </a:fld>
             <a:endParaRPr lang="en-US"/>
           </a:p>
@@ -2226,7 +2280,7 @@
           <a:p>
             <a:fld id="{819FB65F-77A9-44EE-854A-5630BF17D415}" type="datetimeFigureOut">
               <a:rPr lang="en-US" smtClean="0"/>
-              <a:t>11/12/2019</a:t>
+              <a:t>11/13/2019</a:t>
             </a:fld>
             <a:endParaRPr lang="en-US"/>
           </a:p>
@@ -2344,7 +2398,7 @@
           <a:p>
             <a:fld id="{819FB65F-77A9-44EE-854A-5630BF17D415}" type="datetimeFigureOut">
               <a:rPr lang="en-US" smtClean="0"/>
-              <a:t>11/12/2019</a:t>
+              <a:t>11/13/2019</a:t>
             </a:fld>
             <a:endParaRPr lang="en-US"/>
           </a:p>
@@ -2439,7 +2493,7 @@
           <a:p>
             <a:fld id="{819FB65F-77A9-44EE-854A-5630BF17D415}" type="datetimeFigureOut">
               <a:rPr lang="en-US" smtClean="0"/>
-              <a:t>11/12/2019</a:t>
+              <a:t>11/13/2019</a:t>
             </a:fld>
             <a:endParaRPr lang="en-US"/>
           </a:p>
@@ -2716,7 +2770,7 @@
           <a:p>
             <a:fld id="{819FB65F-77A9-44EE-854A-5630BF17D415}" type="datetimeFigureOut">
               <a:rPr lang="en-US" smtClean="0"/>
-              <a:t>11/12/2019</a:t>
+              <a:t>11/13/2019</a:t>
             </a:fld>
             <a:endParaRPr lang="en-US"/>
           </a:p>
@@ -2973,7 +3027,7 @@
           <a:p>
             <a:fld id="{819FB65F-77A9-44EE-854A-5630BF17D415}" type="datetimeFigureOut">
               <a:rPr lang="en-US" smtClean="0"/>
-              <a:t>11/12/2019</a:t>
+              <a:t>11/13/2019</a:t>
             </a:fld>
             <a:endParaRPr lang="en-US"/>
           </a:p>
@@ -3186,7 +3240,7 @@
           <a:p>
             <a:fld id="{819FB65F-77A9-44EE-854A-5630BF17D415}" type="datetimeFigureOut">
               <a:rPr lang="en-US" smtClean="0"/>
-              <a:t>11/12/2019</a:t>
+              <a:t>11/13/2019</a:t>
             </a:fld>
             <a:endParaRPr lang="en-US"/>
           </a:p>
@@ -3607,8 +3661,8 @@
         </p:nvSpPr>
         <p:spPr bwMode="auto">
           <a:xfrm rot="10800000">
-            <a:off x="8490" y="7273738"/>
-            <a:ext cx="30275213" cy="35530024"/>
+            <a:off x="8490" y="6292738"/>
+            <a:ext cx="30275213" cy="36511024"/>
           </a:xfrm>
           <a:prstGeom prst="rect">
             <a:avLst/>
@@ -3668,7 +3722,7 @@
         <p:spPr bwMode="auto">
           <a:xfrm>
             <a:off x="-1" y="290632"/>
-            <a:ext cx="30275213" cy="6744069"/>
+            <a:ext cx="30275213" cy="5297519"/>
           </a:xfrm>
           <a:prstGeom prst="rect">
             <a:avLst/>
@@ -3945,7 +3999,7 @@
           </a:p>
           <a:p>
             <a:r>
-              <a:rPr lang="en-GB" sz="4400" baseline="30000" dirty="0">
+              <a:rPr lang="en-GB" sz="2800" baseline="30000" dirty="0">
                 <a:solidFill>
                   <a:schemeClr val="tx1"/>
                 </a:solidFill>
@@ -3955,7 +4009,7 @@
               <a:t>1</a:t>
             </a:r>
             <a:r>
-              <a:rPr lang="en-GB" sz="4400" dirty="0">
+              <a:rPr lang="en-GB" sz="2800" dirty="0">
                 <a:solidFill>
                   <a:schemeClr val="tx1"/>
                 </a:solidFill>
@@ -3967,7 +4021,7 @@
           </a:p>
           <a:p>
             <a:r>
-              <a:rPr lang="en-GB" sz="4400" baseline="30000" dirty="0">
+              <a:rPr lang="en-GB" sz="2800" baseline="30000" dirty="0">
                 <a:solidFill>
                   <a:schemeClr val="tx1"/>
                 </a:solidFill>
@@ -3977,7 +4031,7 @@
               <a:t>2</a:t>
             </a:r>
             <a:r>
-              <a:rPr lang="en-GB" sz="4400" dirty="0">
+              <a:rPr lang="en-GB" sz="2800" dirty="0">
                 <a:solidFill>
                   <a:schemeClr val="tx1"/>
                 </a:solidFill>
@@ -3989,7 +4043,7 @@
           </a:p>
           <a:p>
             <a:r>
-              <a:rPr lang="en-GB" sz="4400" baseline="30000" dirty="0">
+              <a:rPr lang="en-GB" sz="2800" baseline="30000" dirty="0">
                 <a:solidFill>
                   <a:schemeClr val="tx1"/>
                 </a:solidFill>
@@ -3999,7 +4053,7 @@
               <a:t>*</a:t>
             </a:r>
             <a:r>
-              <a:rPr lang="en-GB" sz="4400" dirty="0">
+              <a:rPr lang="en-GB" sz="2800" dirty="0">
                 <a:solidFill>
                   <a:schemeClr val="tx1"/>
                 </a:solidFill>
@@ -4009,7 +4063,7 @@
               <a:t>E-mail: </a:t>
             </a:r>
             <a:r>
-              <a:rPr lang="en-GB" sz="4400" dirty="0">
+              <a:rPr lang="en-GB" sz="2800" dirty="0">
                 <a:solidFill>
                   <a:schemeClr val="accent1">
                     <a:lumMod val="75000"/>
@@ -4028,7 +4082,7 @@
               <a:t>m.huguenin-virchaux@unsw.edu.au</a:t>
             </a:r>
             <a:r>
-              <a:rPr lang="en-GB" sz="4400" dirty="0">
+              <a:rPr lang="en-GB" sz="2800" dirty="0">
                 <a:solidFill>
                   <a:schemeClr val="accent1">
                     <a:lumMod val="75000"/>
@@ -4041,7 +4095,7 @@
             </a:r>
           </a:p>
           <a:p>
-            <a:endParaRPr lang="en-GB" sz="3200" dirty="0">
+            <a:endParaRPr lang="en-GB" sz="1800" dirty="0">
               <a:solidFill>
                 <a:schemeClr val="accent1">
                   <a:lumMod val="75000"/>
@@ -4053,14 +4107,26 @@
           </a:p>
           <a:p>
             <a:r>
-              <a:rPr lang="en-GB" sz="4400" dirty="0">
+              <a:rPr lang="en-GB" sz="2800" dirty="0">
                 <a:solidFill>
                   <a:schemeClr val="tx1"/>
                 </a:solidFill>
                 <a:latin typeface="Arial" panose="020B0604020202020204" pitchFamily="34" charset="0"/>
                 <a:cs typeface="Arial" panose="020B0604020202020204" pitchFamily="34" charset="0"/>
               </a:rPr>
-              <a:t>     link to .PDF</a:t>
+              <a:t>     </a:t>
+            </a:r>
+          </a:p>
+          <a:p>
+            <a:r>
+              <a:rPr lang="en-GB" sz="2800" dirty="0">
+                <a:solidFill>
+                  <a:schemeClr val="tx1"/>
+                </a:solidFill>
+                <a:latin typeface="Arial" panose="020B0604020202020204" pitchFamily="34" charset="0"/>
+                <a:cs typeface="Arial" panose="020B0604020202020204" pitchFamily="34" charset="0"/>
+              </a:rPr>
+              <a:t>       link to .PDF</a:t>
             </a:r>
           </a:p>
         </p:txBody>
@@ -4079,12 +4145,12 @@
         </p:nvSpPr>
         <p:spPr>
           <a:xfrm>
-            <a:off x="253223" y="19907617"/>
-            <a:ext cx="29715643" cy="7961345"/>
+            <a:off x="182082" y="6575714"/>
+            <a:ext cx="29715643" cy="22934640"/>
           </a:xfrm>
           <a:prstGeom prst="roundRect">
             <a:avLst>
-              <a:gd name="adj" fmla="val 3897"/>
+              <a:gd name="adj" fmla="val 1537"/>
             </a:avLst>
           </a:prstGeom>
           <a:solidFill>
@@ -4138,7 +4204,7 @@
         </p:nvSpPr>
         <p:spPr>
           <a:xfrm>
-            <a:off x="323330" y="15056524"/>
+            <a:off x="-33039467" y="15518668"/>
             <a:ext cx="29645536" cy="4599872"/>
           </a:xfrm>
           <a:prstGeom prst="roundRect">
@@ -4197,12 +4263,12 @@
         </p:nvSpPr>
         <p:spPr>
           <a:xfrm>
-            <a:off x="323330" y="7476929"/>
-            <a:ext cx="29645536" cy="7346908"/>
+            <a:off x="146885" y="29825833"/>
+            <a:ext cx="29715642" cy="12687297"/>
           </a:xfrm>
           <a:prstGeom prst="roundRect">
             <a:avLst>
-              <a:gd name="adj" fmla="val 5749"/>
+              <a:gd name="adj" fmla="val 3467"/>
             </a:avLst>
           </a:prstGeom>
           <a:solidFill>
@@ -4256,7 +4322,7 @@
         </p:nvSpPr>
         <p:spPr>
           <a:xfrm>
-            <a:off x="490780" y="7499325"/>
+            <a:off x="-31747455" y="33911312"/>
             <a:ext cx="29252315" cy="7478970"/>
           </a:xfrm>
           <a:prstGeom prst="rect">
@@ -4360,65 +4426,6 @@
               </a:rPr>
               <a:t>Using the Water Mass Transformation framework to analyse the WWV balance terms</a:t>
             </a:r>
-          </a:p>
-        </p:txBody>
-      </p:sp>
-      <p:sp>
-        <p:nvSpPr>
-          <p:cNvPr id="94" name="Rectangle: Rounded Corners 93">
-            <a:extLst>
-              <a:ext uri="{FF2B5EF4-FFF2-40B4-BE49-F238E27FC236}">
-                <a16:creationId xmlns:a16="http://schemas.microsoft.com/office/drawing/2014/main" id="{844244FA-A2EB-48A9-8F1B-EA0706816116}"/>
-              </a:ext>
-            </a:extLst>
-          </p:cNvPr>
-          <p:cNvSpPr/>
-          <p:nvPr/>
-        </p:nvSpPr>
-        <p:spPr>
-          <a:xfrm>
-            <a:off x="193590" y="28072152"/>
-            <a:ext cx="29775276" cy="14440979"/>
-          </a:xfrm>
-          <a:prstGeom prst="roundRect">
-            <a:avLst>
-              <a:gd name="adj" fmla="val 2360"/>
-            </a:avLst>
-          </a:prstGeom>
-          <a:solidFill>
-            <a:schemeClr val="bg1"/>
-          </a:solidFill>
-          <a:ln w="38100">
-            <a:solidFill>
-              <a:schemeClr val="tx1"/>
-            </a:solidFill>
-          </a:ln>
-        </p:spPr>
-        <p:style>
-          <a:lnRef idx="2">
-            <a:schemeClr val="accent1">
-              <a:shade val="50000"/>
-            </a:schemeClr>
-          </a:lnRef>
-          <a:fillRef idx="1">
-            <a:schemeClr val="accent1"/>
-          </a:fillRef>
-          <a:effectRef idx="0">
-            <a:schemeClr val="accent1"/>
-          </a:effectRef>
-          <a:fontRef idx="minor">
-            <a:schemeClr val="lt1"/>
-          </a:fontRef>
-        </p:style>
-        <p:txBody>
-          <a:bodyPr rtlCol="0" anchor="ctr"/>
-          <a:lstStyle/>
-          <a:p>
-            <a:pPr algn="ctr"/>
-            <a:endParaRPr lang="en-GB">
-              <a:latin typeface="Arial" panose="020B0604020202020204" pitchFamily="34" charset="0"/>
-              <a:cs typeface="Arial" panose="020B0604020202020204" pitchFamily="34" charset="0"/>
-            </a:endParaRPr>
           </a:p>
         </p:txBody>
       </p:sp>
@@ -4450,7 +4457,7 @@
         </p:blipFill>
         <p:spPr>
           <a:xfrm>
-            <a:off x="704781" y="5036249"/>
+            <a:off x="704781" y="3940762"/>
             <a:ext cx="5574236" cy="2359761"/>
           </a:xfrm>
           <a:prstGeom prst="rect">
@@ -4487,7 +4494,7 @@
         </p:blipFill>
         <p:spPr bwMode="auto">
           <a:xfrm>
-            <a:off x="21227505" y="5243809"/>
+            <a:off x="21227505" y="4148322"/>
             <a:ext cx="8374850" cy="1625706"/>
           </a:xfrm>
           <a:prstGeom prst="rect">
@@ -4535,7 +4542,7 @@
         </p:blipFill>
         <p:spPr>
           <a:xfrm>
-            <a:off x="12385412" y="5837477"/>
+            <a:off x="13035130" y="4540998"/>
             <a:ext cx="1436262" cy="1436262"/>
           </a:xfrm>
           <a:prstGeom prst="rect">
@@ -4571,7 +4578,7 @@
         </p:blipFill>
         <p:spPr>
           <a:xfrm>
-            <a:off x="422721" y="15982373"/>
+            <a:off x="-36038979" y="25036994"/>
             <a:ext cx="11362194" cy="2060135"/>
           </a:xfrm>
           <a:prstGeom prst="rect">
@@ -4593,7 +4600,7 @@
         </p:nvSpPr>
         <p:spPr>
           <a:xfrm>
-            <a:off x="484534" y="15025586"/>
+            <a:off x="-35177066" y="23888289"/>
             <a:ext cx="14562302" cy="830997"/>
           </a:xfrm>
           <a:prstGeom prst="rect">
@@ -4631,7 +4638,7 @@
         </p:nvSpPr>
         <p:spPr>
           <a:xfrm>
-            <a:off x="484534" y="18097341"/>
+            <a:off x="-36038979" y="28036574"/>
             <a:ext cx="11362194" cy="1569660"/>
           </a:xfrm>
           <a:prstGeom prst="rect">
@@ -4662,36 +4669,6 @@
           </a:p>
         </p:txBody>
       </p:sp>
-      <p:pic>
-        <p:nvPicPr>
-          <p:cNvPr id="2" name="Picture 1">
-            <a:extLst>
-              <a:ext uri="{FF2B5EF4-FFF2-40B4-BE49-F238E27FC236}">
-                <a16:creationId xmlns:a16="http://schemas.microsoft.com/office/drawing/2014/main" id="{396DD53B-0213-4461-A097-622FB4C597BE}"/>
-              </a:ext>
-            </a:extLst>
-          </p:cNvPr>
-          <p:cNvPicPr>
-            <a:picLocks noChangeAspect="1"/>
-          </p:cNvPicPr>
-          <p:nvPr/>
-        </p:nvPicPr>
-        <p:blipFill>
-          <a:blip r:embed="rId9"/>
-          <a:stretch>
-            <a:fillRect/>
-          </a:stretch>
-        </p:blipFill>
-        <p:spPr>
-          <a:xfrm>
-            <a:off x="12229021" y="15410530"/>
-            <a:ext cx="17500476" cy="2312316"/>
-          </a:xfrm>
-          <a:prstGeom prst="rect">
-            <a:avLst/>
-          </a:prstGeom>
-        </p:spPr>
-      </p:pic>
       <p:sp>
         <p:nvSpPr>
           <p:cNvPr id="32" name="TextBox 31">
@@ -4706,7 +4683,7 @@
         </p:nvSpPr>
         <p:spPr>
           <a:xfrm>
-            <a:off x="12385412" y="18107764"/>
+            <a:off x="-21859741" y="26910927"/>
             <a:ext cx="17545914" cy="1569660"/>
           </a:xfrm>
           <a:prstGeom prst="rect">
@@ -4737,77 +4714,6 @@
           </a:p>
         </p:txBody>
       </p:sp>
-      <p:pic>
-        <p:nvPicPr>
-          <p:cNvPr id="6" name="Picture 5">
-            <a:extLst>
-              <a:ext uri="{FF2B5EF4-FFF2-40B4-BE49-F238E27FC236}">
-                <a16:creationId xmlns:a16="http://schemas.microsoft.com/office/drawing/2014/main" id="{3754CFB9-9D8E-476E-856E-AF78FBD3FBD4}"/>
-              </a:ext>
-            </a:extLst>
-          </p:cNvPr>
-          <p:cNvPicPr>
-            <a:picLocks noChangeAspect="1"/>
-          </p:cNvPicPr>
-          <p:nvPr/>
-        </p:nvPicPr>
-        <p:blipFill rotWithShape="1">
-          <a:blip r:embed="rId10" cstate="print">
-            <a:extLst>
-              <a:ext uri="{28A0092B-C50C-407E-A947-70E740481C1C}">
-                <a14:useLocalDpi xmlns:a14="http://schemas.microsoft.com/office/drawing/2010/main" val="0"/>
-              </a:ext>
-            </a:extLst>
-          </a:blip>
-          <a:srcRect l="11521" r="11918" b="5596"/>
-          <a:stretch/>
-        </p:blipFill>
-        <p:spPr>
-          <a:xfrm>
-            <a:off x="704781" y="33257458"/>
-            <a:ext cx="14219602" cy="7013867"/>
-          </a:xfrm>
-          <a:prstGeom prst="rect">
-            <a:avLst/>
-          </a:prstGeom>
-        </p:spPr>
-      </p:pic>
-      <p:pic>
-        <p:nvPicPr>
-          <p:cNvPr id="9" name="Picture 8" descr="A close up of a map&#10;&#10;Description automatically generated">
-            <a:extLst>
-              <a:ext uri="{FF2B5EF4-FFF2-40B4-BE49-F238E27FC236}">
-                <a16:creationId xmlns:a16="http://schemas.microsoft.com/office/drawing/2014/main" id="{2C7FF6E3-D4A7-4D6A-9EB5-636EE6B3090C}"/>
-              </a:ext>
-            </a:extLst>
-          </p:cNvPr>
-          <p:cNvPicPr>
-            <a:picLocks noChangeAspect="1"/>
-          </p:cNvPicPr>
-          <p:nvPr/>
-        </p:nvPicPr>
-        <p:blipFill>
-          <a:blip r:embed="rId11" cstate="print">
-            <a:extLst>
-              <a:ext uri="{28A0092B-C50C-407E-A947-70E740481C1C}">
-                <a14:useLocalDpi xmlns:a14="http://schemas.microsoft.com/office/drawing/2010/main" val="0"/>
-              </a:ext>
-            </a:extLst>
-          </a:blip>
-          <a:stretch>
-            <a:fillRect/>
-          </a:stretch>
-        </p:blipFill>
-        <p:spPr>
-          <a:xfrm>
-            <a:off x="16011517" y="33797903"/>
-            <a:ext cx="12458132" cy="6230134"/>
-          </a:xfrm>
-          <a:prstGeom prst="rect">
-            <a:avLst/>
-          </a:prstGeom>
-        </p:spPr>
-      </p:pic>
       <p:sp>
         <p:nvSpPr>
           <p:cNvPr id="39" name="TextBox 38">
@@ -4822,8 +4728,8 @@
         </p:nvSpPr>
         <p:spPr>
           <a:xfrm>
-            <a:off x="490780" y="28108886"/>
-            <a:ext cx="28773044" cy="5262979"/>
+            <a:off x="285659" y="30457929"/>
+            <a:ext cx="14850431" cy="8217634"/>
           </a:xfrm>
           <a:prstGeom prst="rect">
             <a:avLst/>
@@ -4836,6 +4742,7 @@
           </a:bodyPr>
           <a:lstStyle/>
           <a:p>
+            <a:pPr algn="just"/>
             <a:r>
               <a:rPr lang="en-GB" sz="4800" dirty="0">
                 <a:latin typeface="Arial" panose="020B0604020202020204" pitchFamily="34" charset="0"/>
@@ -4845,7 +4752,7 @@
             </a:r>
           </a:p>
           <a:p>
-            <a:pPr marL="914400" indent="-914400">
+            <a:pPr marL="914400" indent="-914400" algn="just">
               <a:buFont typeface="+mj-lt"/>
               <a:buAutoNum type="arabicPeriod"/>
             </a:pPr>
@@ -4854,11 +4761,24 @@
                 <a:latin typeface="Arial" panose="020B0604020202020204" pitchFamily="34" charset="0"/>
                 <a:cs typeface="Arial" panose="020B0604020202020204" pitchFamily="34" charset="0"/>
               </a:rPr>
-              <a:t>While adiabatic volume fluxes are mostly symmetric for El Niño and La Niña, the diabatic fluxes show a strong asymmetry</a:t>
-            </a:r>
-          </a:p>
-          <a:p>
-            <a:pPr marL="914400" indent="-914400">
+              <a:t>This study presents a comprehensive analysis of individually calculated upper ocean heat and volume fluxes during ENSO</a:t>
+            </a:r>
+          </a:p>
+          <a:p>
+            <a:pPr marL="914400" indent="-914400" algn="just">
+              <a:buFont typeface="+mj-lt"/>
+              <a:buAutoNum type="arabicPeriod"/>
+            </a:pPr>
+            <a:r>
+              <a:rPr lang="en-GB" sz="4800" dirty="0">
+                <a:latin typeface="Arial" panose="020B0604020202020204" pitchFamily="34" charset="0"/>
+                <a:cs typeface="Arial" panose="020B0604020202020204" pitchFamily="34" charset="0"/>
+              </a:rPr>
+              <a:t>Adiabatic volume fluxes are mostly symmetric for El Niño and La Niña, diabatic fluxes show a strong asymmetry and peak three to six months earlier</a:t>
+            </a:r>
+          </a:p>
+          <a:p>
+            <a:pPr marL="914400" indent="-914400" algn="just">
               <a:buFont typeface="+mj-lt"/>
               <a:buAutoNum type="arabicPeriod"/>
             </a:pPr>
@@ -4870,56 +4790,8 @@
               <a:t>The large event-to-event variability of the surface forcing flux during La Niña is linked to the shoaling of the 20°C isotherm in the eastern equatorial Pacific</a:t>
             </a:r>
           </a:p>
-          <a:p>
-            <a:pPr marL="914400" indent="-914400">
-              <a:buFont typeface="+mj-lt"/>
-              <a:buAutoNum type="arabicPeriod"/>
-            </a:pPr>
-            <a:r>
-              <a:rPr lang="en-GB" sz="4800" dirty="0">
-                <a:latin typeface="Arial" panose="020B0604020202020204" pitchFamily="34" charset="0"/>
-                <a:cs typeface="Arial" panose="020B0604020202020204" pitchFamily="34" charset="0"/>
-              </a:rPr>
-              <a:t>The diabatic volume fluxes peak three to six months prior to changes in the warm water volume and much sooner than the adiabatic fluxes</a:t>
-            </a:r>
-          </a:p>
-        </p:txBody>
-      </p:sp>
-      <p:pic>
-        <p:nvPicPr>
-          <p:cNvPr id="4" name="Picture 3" descr="A picture containing text, map&#10;&#10;Description automatically generated">
-            <a:extLst>
-              <a:ext uri="{FF2B5EF4-FFF2-40B4-BE49-F238E27FC236}">
-                <a16:creationId xmlns:a16="http://schemas.microsoft.com/office/drawing/2014/main" id="{E9D8AB2E-C3E1-49E7-A635-9D3A257C8CAE}"/>
-              </a:ext>
-            </a:extLst>
-          </p:cNvPr>
-          <p:cNvPicPr>
-            <a:picLocks noChangeAspect="1"/>
-          </p:cNvPicPr>
-          <p:nvPr/>
-        </p:nvPicPr>
-        <p:blipFill rotWithShape="1">
-          <a:blip r:embed="rId12">
-            <a:extLst>
-              <a:ext uri="{28A0092B-C50C-407E-A947-70E740481C1C}">
-                <a14:useLocalDpi xmlns:a14="http://schemas.microsoft.com/office/drawing/2010/main" val="0"/>
-              </a:ext>
-            </a:extLst>
-          </a:blip>
-          <a:srcRect b="48121"/>
-          <a:stretch/>
-        </p:blipFill>
-        <p:spPr>
-          <a:xfrm>
-            <a:off x="396043" y="20015825"/>
-            <a:ext cx="14562302" cy="6083642"/>
-          </a:xfrm>
-          <a:prstGeom prst="rect">
-            <a:avLst/>
-          </a:prstGeom>
-        </p:spPr>
-      </p:pic>
+        </p:txBody>
+      </p:sp>
       <p:sp>
         <p:nvSpPr>
           <p:cNvPr id="16" name="TextBox 15">
@@ -4934,8 +4806,8 @@
         </p:nvSpPr>
         <p:spPr>
           <a:xfrm>
-            <a:off x="484534" y="26216259"/>
-            <a:ext cx="28622807" cy="1569660"/>
+            <a:off x="312646" y="13221143"/>
+            <a:ext cx="29124753" cy="3046988"/>
           </a:xfrm>
           <a:prstGeom prst="rect">
             <a:avLst/>
@@ -4948,19 +4820,20 @@
           </a:bodyPr>
           <a:lstStyle/>
           <a:p>
+            <a:pPr algn="just"/>
             <a:r>
               <a:rPr lang="en-GB" sz="4800" b="1" dirty="0">
                 <a:latin typeface="Arial" panose="020B0604020202020204" pitchFamily="34" charset="0"/>
                 <a:cs typeface="Arial" panose="020B0604020202020204" pitchFamily="34" charset="0"/>
               </a:rPr>
-              <a:t>Fig. 2 </a:t>
+              <a:t>Fig. 1 </a:t>
             </a:r>
             <a:r>
               <a:rPr lang="en-GB" sz="4800" dirty="0">
                 <a:latin typeface="Arial" panose="020B0604020202020204" pitchFamily="34" charset="0"/>
                 <a:cs typeface="Arial" panose="020B0604020202020204" pitchFamily="34" charset="0"/>
               </a:rPr>
-              <a:t>Schematics representing the discharge and recharge phases of WWV during idealised symmetric (a) El Niño and (b) La Niña events. The overall contribution of each flux is given as a unit of 10</a:t>
+              <a:t>Schematics representing the discharge and recharge phases of Warm Water Volume (WWV)  during idealised symmetric (a) El Niño and (b) La Niña events in the MOM5 model. WWV is a proxy for the equatorial Pacific’s upper ocean heat content and a key inclusion in ENSO forecasting. The overall contribution of each flux is given as a unit of 10</a:t>
             </a:r>
             <a:r>
               <a:rPr lang="en-GB" sz="4800" baseline="30000" dirty="0">
@@ -4993,125 +4866,181 @@
           </a:p>
         </p:txBody>
       </p:sp>
-      <p:pic>
-        <p:nvPicPr>
-          <p:cNvPr id="37" name="Picture 36" descr="A picture containing text, map&#10;&#10;Description automatically generated">
+      <p:grpSp>
+        <p:nvGrpSpPr>
+          <p:cNvPr id="15" name="Group 14">
             <a:extLst>
               <a:ext uri="{FF2B5EF4-FFF2-40B4-BE49-F238E27FC236}">
-                <a16:creationId xmlns:a16="http://schemas.microsoft.com/office/drawing/2014/main" id="{D38DCDC5-7A10-4C3F-A848-19B2023A6320}"/>
+                <a16:creationId xmlns:a16="http://schemas.microsoft.com/office/drawing/2014/main" id="{53828D91-9326-4322-B885-A53616E1C77C}"/>
               </a:ext>
             </a:extLst>
           </p:cNvPr>
-          <p:cNvPicPr>
-            <a:picLocks noChangeAspect="1"/>
-          </p:cNvPicPr>
+          <p:cNvGrpSpPr/>
           <p:nvPr/>
-        </p:nvPicPr>
-        <p:blipFill rotWithShape="1">
-          <a:blip r:embed="rId12">
-            <a:extLst>
-              <a:ext uri="{28A0092B-C50C-407E-A947-70E740481C1C}">
-                <a14:useLocalDpi xmlns:a14="http://schemas.microsoft.com/office/drawing/2010/main" val="0"/>
-              </a:ext>
-            </a:extLst>
-          </a:blip>
-          <a:srcRect l="129" t="55415" r="-129" b="-7294"/>
-          <a:stretch/>
-        </p:blipFill>
-        <p:spPr>
+        </p:nvGrpSpPr>
+        <p:grpSpPr>
           <a:xfrm>
-            <a:off x="15344177" y="20827763"/>
-            <a:ext cx="14562302" cy="6083642"/>
+            <a:off x="222693" y="6896818"/>
+            <a:ext cx="29510436" cy="6895580"/>
+            <a:chOff x="321757" y="10877851"/>
+            <a:chExt cx="29510436" cy="6895580"/>
           </a:xfrm>
-          <a:prstGeom prst="rect">
-            <a:avLst/>
-          </a:prstGeom>
-        </p:spPr>
-      </p:pic>
-      <p:sp>
-        <p:nvSpPr>
-          <p:cNvPr id="13" name="TextBox 12">
-            <a:extLst>
-              <a:ext uri="{FF2B5EF4-FFF2-40B4-BE49-F238E27FC236}">
-                <a16:creationId xmlns:a16="http://schemas.microsoft.com/office/drawing/2014/main" id="{FBC2F2C6-84D3-45F2-A502-45339F8225A8}"/>
-              </a:ext>
-            </a:extLst>
-          </p:cNvPr>
-          <p:cNvSpPr txBox="1"/>
-          <p:nvPr/>
-        </p:nvSpPr>
-        <p:spPr>
-          <a:xfrm>
-            <a:off x="4135794" y="20096744"/>
-            <a:ext cx="7259782" cy="1107996"/>
-          </a:xfrm>
-          <a:prstGeom prst="rect">
-            <a:avLst/>
-          </a:prstGeom>
-          <a:noFill/>
-        </p:spPr>
-        <p:txBody>
-          <a:bodyPr wrap="square" rtlCol="0">
-            <a:spAutoFit/>
-          </a:bodyPr>
-          <a:lstStyle/>
-          <a:p>
-            <a:pPr algn="ctr"/>
-            <a:r>
-              <a:rPr lang="en-GB" sz="6600" dirty="0">
-                <a:solidFill>
-                  <a:srgbClr val="A50026"/>
-                </a:solidFill>
-                <a:latin typeface="Arial" panose="020B0604020202020204" pitchFamily="34" charset="0"/>
-                <a:cs typeface="Arial" panose="020B0604020202020204" pitchFamily="34" charset="0"/>
-              </a:rPr>
-              <a:t>EL NIÑO</a:t>
-            </a:r>
-          </a:p>
-        </p:txBody>
-      </p:sp>
-      <p:sp>
-        <p:nvSpPr>
-          <p:cNvPr id="64" name="TextBox 63">
-            <a:extLst>
-              <a:ext uri="{FF2B5EF4-FFF2-40B4-BE49-F238E27FC236}">
-                <a16:creationId xmlns:a16="http://schemas.microsoft.com/office/drawing/2014/main" id="{56421ADF-DEA6-42E9-8C56-58270941A74B}"/>
-              </a:ext>
-            </a:extLst>
-          </p:cNvPr>
-          <p:cNvSpPr txBox="1"/>
-          <p:nvPr/>
-        </p:nvSpPr>
-        <p:spPr>
-          <a:xfrm>
-            <a:off x="19441273" y="20096744"/>
-            <a:ext cx="7259782" cy="1107996"/>
-          </a:xfrm>
-          <a:prstGeom prst="rect">
-            <a:avLst/>
-          </a:prstGeom>
-          <a:noFill/>
-        </p:spPr>
-        <p:txBody>
-          <a:bodyPr wrap="square" rtlCol="0">
-            <a:spAutoFit/>
-          </a:bodyPr>
-          <a:lstStyle/>
-          <a:p>
-            <a:pPr algn="ctr"/>
-            <a:r>
-              <a:rPr lang="en-GB" sz="6600" dirty="0">
-                <a:solidFill>
-                  <a:srgbClr val="313695"/>
-                </a:solidFill>
-                <a:latin typeface="Arial" panose="020B0604020202020204" pitchFamily="34" charset="0"/>
-                <a:cs typeface="Arial" panose="020B0604020202020204" pitchFamily="34" charset="0"/>
-              </a:rPr>
-              <a:t>LA NIÑA</a:t>
-            </a:r>
-          </a:p>
-        </p:txBody>
-      </p:sp>
+        </p:grpSpPr>
+        <p:pic>
+          <p:nvPicPr>
+            <p:cNvPr id="4" name="Picture 3" descr="A picture containing text, map&#10;&#10;Description automatically generated">
+              <a:extLst>
+                <a:ext uri="{FF2B5EF4-FFF2-40B4-BE49-F238E27FC236}">
+                  <a16:creationId xmlns:a16="http://schemas.microsoft.com/office/drawing/2014/main" id="{E9D8AB2E-C3E1-49E7-A635-9D3A257C8CAE}"/>
+                </a:ext>
+              </a:extLst>
+            </p:cNvPr>
+            <p:cNvPicPr>
+              <a:picLocks noChangeAspect="1"/>
+            </p:cNvPicPr>
+            <p:nvPr/>
+          </p:nvPicPr>
+          <p:blipFill rotWithShape="1">
+            <a:blip r:embed="rId9">
+              <a:extLst>
+                <a:ext uri="{28A0092B-C50C-407E-A947-70E740481C1C}">
+                  <a14:useLocalDpi xmlns:a14="http://schemas.microsoft.com/office/drawing/2010/main" val="0"/>
+                </a:ext>
+              </a:extLst>
+            </a:blip>
+            <a:srcRect b="48121"/>
+            <a:stretch/>
+          </p:blipFill>
+          <p:spPr>
+            <a:xfrm>
+              <a:off x="321757" y="10877851"/>
+              <a:ext cx="14562302" cy="6083642"/>
+            </a:xfrm>
+            <a:prstGeom prst="rect">
+              <a:avLst/>
+            </a:prstGeom>
+          </p:spPr>
+        </p:pic>
+        <p:pic>
+          <p:nvPicPr>
+            <p:cNvPr id="37" name="Picture 36" descr="A picture containing text, map&#10;&#10;Description automatically generated">
+              <a:extLst>
+                <a:ext uri="{FF2B5EF4-FFF2-40B4-BE49-F238E27FC236}">
+                  <a16:creationId xmlns:a16="http://schemas.microsoft.com/office/drawing/2014/main" id="{D38DCDC5-7A10-4C3F-A848-19B2023A6320}"/>
+                </a:ext>
+              </a:extLst>
+            </p:cNvPr>
+            <p:cNvPicPr>
+              <a:picLocks noChangeAspect="1"/>
+            </p:cNvPicPr>
+            <p:nvPr/>
+          </p:nvPicPr>
+          <p:blipFill rotWithShape="1">
+            <a:blip r:embed="rId9">
+              <a:extLst>
+                <a:ext uri="{28A0092B-C50C-407E-A947-70E740481C1C}">
+                  <a14:useLocalDpi xmlns:a14="http://schemas.microsoft.com/office/drawing/2010/main" val="0"/>
+                </a:ext>
+              </a:extLst>
+            </a:blip>
+            <a:srcRect l="129" t="55415" r="-129" b="-7294"/>
+            <a:stretch/>
+          </p:blipFill>
+          <p:spPr>
+            <a:xfrm>
+              <a:off x="15269891" y="11689789"/>
+              <a:ext cx="14562302" cy="6083642"/>
+            </a:xfrm>
+            <a:prstGeom prst="rect">
+              <a:avLst/>
+            </a:prstGeom>
+          </p:spPr>
+        </p:pic>
+        <p:sp>
+          <p:nvSpPr>
+            <p:cNvPr id="13" name="TextBox 12">
+              <a:extLst>
+                <a:ext uri="{FF2B5EF4-FFF2-40B4-BE49-F238E27FC236}">
+                  <a16:creationId xmlns:a16="http://schemas.microsoft.com/office/drawing/2014/main" id="{FBC2F2C6-84D3-45F2-A502-45339F8225A8}"/>
+                </a:ext>
+              </a:extLst>
+            </p:cNvPr>
+            <p:cNvSpPr txBox="1"/>
+            <p:nvPr/>
+          </p:nvSpPr>
+          <p:spPr>
+            <a:xfrm>
+              <a:off x="4061508" y="10958770"/>
+              <a:ext cx="7259782" cy="1107996"/>
+            </a:xfrm>
+            <a:prstGeom prst="rect">
+              <a:avLst/>
+            </a:prstGeom>
+            <a:noFill/>
+          </p:spPr>
+          <p:txBody>
+            <a:bodyPr wrap="square" rtlCol="0">
+              <a:spAutoFit/>
+            </a:bodyPr>
+            <a:lstStyle/>
+            <a:p>
+              <a:pPr algn="ctr"/>
+              <a:r>
+                <a:rPr lang="en-GB" sz="6600" dirty="0">
+                  <a:solidFill>
+                    <a:srgbClr val="A50026"/>
+                  </a:solidFill>
+                  <a:latin typeface="Arial" panose="020B0604020202020204" pitchFamily="34" charset="0"/>
+                  <a:cs typeface="Arial" panose="020B0604020202020204" pitchFamily="34" charset="0"/>
+                </a:rPr>
+                <a:t>EL NIÑO</a:t>
+              </a:r>
+            </a:p>
+          </p:txBody>
+        </p:sp>
+        <p:sp>
+          <p:nvSpPr>
+            <p:cNvPr id="64" name="TextBox 63">
+              <a:extLst>
+                <a:ext uri="{FF2B5EF4-FFF2-40B4-BE49-F238E27FC236}">
+                  <a16:creationId xmlns:a16="http://schemas.microsoft.com/office/drawing/2014/main" id="{56421ADF-DEA6-42E9-8C56-58270941A74B}"/>
+                </a:ext>
+              </a:extLst>
+            </p:cNvPr>
+            <p:cNvSpPr txBox="1"/>
+            <p:nvPr/>
+          </p:nvSpPr>
+          <p:spPr>
+            <a:xfrm>
+              <a:off x="19366987" y="10958770"/>
+              <a:ext cx="7259782" cy="1107996"/>
+            </a:xfrm>
+            <a:prstGeom prst="rect">
+              <a:avLst/>
+            </a:prstGeom>
+            <a:noFill/>
+          </p:spPr>
+          <p:txBody>
+            <a:bodyPr wrap="square" rtlCol="0">
+              <a:spAutoFit/>
+            </a:bodyPr>
+            <a:lstStyle/>
+            <a:p>
+              <a:pPr algn="ctr"/>
+              <a:r>
+                <a:rPr lang="en-GB" sz="6600" dirty="0">
+                  <a:solidFill>
+                    <a:srgbClr val="313695"/>
+                  </a:solidFill>
+                  <a:latin typeface="Arial" panose="020B0604020202020204" pitchFamily="34" charset="0"/>
+                  <a:cs typeface="Arial" panose="020B0604020202020204" pitchFamily="34" charset="0"/>
+                </a:rPr>
+                <a:t>LA NIÑA</a:t>
+              </a:r>
+            </a:p>
+          </p:txBody>
+        </p:sp>
+      </p:grpSp>
       <p:sp>
         <p:nvSpPr>
           <p:cNvPr id="95" name="TextBox 94">
@@ -5126,8 +5055,8 @@
         </p:nvSpPr>
         <p:spPr>
           <a:xfrm>
-            <a:off x="483386" y="40261738"/>
-            <a:ext cx="15528131" cy="2308324"/>
+            <a:off x="441292" y="27657719"/>
+            <a:ext cx="29124752" cy="1569660"/>
           </a:xfrm>
           <a:prstGeom prst="rect">
             <a:avLst/>
@@ -5145,14 +5074,14 @@
                 <a:latin typeface="Arial" panose="020B0604020202020204" pitchFamily="34" charset="0"/>
                 <a:cs typeface="Arial" panose="020B0604020202020204" pitchFamily="34" charset="0"/>
               </a:rPr>
-              <a:t>Fig. 3 </a:t>
+              <a:t>Fig. 2 </a:t>
             </a:r>
             <a:r>
               <a:rPr lang="en-GB" sz="4800" dirty="0">
                 <a:latin typeface="Arial" panose="020B0604020202020204" pitchFamily="34" charset="0"/>
                 <a:cs typeface="Arial" panose="020B0604020202020204" pitchFamily="34" charset="0"/>
               </a:rPr>
-              <a:t>Time series of the (a) adiabatic and (b) diabatic WWV budget terms during the 1979-2016 ACCESS-OM2 simulation.</a:t>
+              <a:t>Time series of the (a) adiabatic and (b) diabatic WWV budget terms during a simulation with the ¼° ACCESS-OM2 model.</a:t>
             </a:r>
           </a:p>
         </p:txBody>
@@ -5171,8 +5100,8 @@
         </p:nvSpPr>
         <p:spPr>
           <a:xfrm>
-            <a:off x="16499351" y="40250084"/>
-            <a:ext cx="13275585" cy="2308324"/>
+            <a:off x="15561372" y="37827800"/>
+            <a:ext cx="14040983" cy="1569660"/>
           </a:xfrm>
           <a:prstGeom prst="rect">
             <a:avLst/>
@@ -5185,6 +5114,7 @@
           </a:bodyPr>
           <a:lstStyle/>
           <a:p>
+            <a:pPr algn="just"/>
             <a:r>
               <a:rPr lang="en-GB" sz="4800" b="1" dirty="0">
                 <a:latin typeface="Arial" panose="020B0604020202020204" pitchFamily="34" charset="0"/>
@@ -5197,7 +5127,7 @@
                 <a:latin typeface="Arial" panose="020B0604020202020204" pitchFamily="34" charset="0"/>
                 <a:cs typeface="Arial" panose="020B0604020202020204" pitchFamily="34" charset="0"/>
               </a:rPr>
-              <a:t>Lag regression of the (a) adiabatic and (b) diabatic WWV balance terms onto the change in WWV.</a:t>
+              <a:t>Lag regression of (a) adiabatic and (b) diabatic balance terms onto the change in WWV.</a:t>
             </a:r>
           </a:p>
         </p:txBody>
@@ -5218,7 +5148,7 @@
         </p:nvSpPr>
         <p:spPr>
           <a:xfrm>
-            <a:off x="21227505" y="7006109"/>
+            <a:off x="21227505" y="5910622"/>
             <a:ext cx="7094832" cy="405167"/>
           </a:xfrm>
           <a:prstGeom prst="rect">
@@ -5425,6 +5355,355 @@
           </a:p>
         </p:txBody>
       </p:sp>
+      <mc:AlternateContent xmlns:mc="http://schemas.openxmlformats.org/markup-compatibility/2006">
+        <mc:Choice xmlns:p14="http://schemas.microsoft.com/office/powerpoint/2010/main" Requires="p14">
+          <p:contentPart p14:bwMode="auto" r:id="rId10">
+            <p14:nvContentPartPr>
+              <p14:cNvPr id="3" name="Ink 2">
+                <a:extLst>
+                  <a:ext uri="{FF2B5EF4-FFF2-40B4-BE49-F238E27FC236}">
+                    <a16:creationId xmlns:a16="http://schemas.microsoft.com/office/drawing/2014/main" id="{3224F13D-B5EE-4A89-B023-1C09CB045F5F}"/>
+                  </a:ext>
+                </a:extLst>
+              </p14:cNvPr>
+              <p14:cNvContentPartPr/>
+              <p14:nvPr/>
+            </p14:nvContentPartPr>
+            <p14:xfrm>
+              <a:off x="25663230" y="15079320"/>
+              <a:ext cx="360" cy="360"/>
+            </p14:xfrm>
+          </p:contentPart>
+        </mc:Choice>
+        <mc:Fallback>
+          <p:pic>
+            <p:nvPicPr>
+              <p:cNvPr id="3" name="Ink 2">
+                <a:extLst>
+                  <a:ext uri="{FF2B5EF4-FFF2-40B4-BE49-F238E27FC236}">
+                    <a16:creationId xmlns:a16="http://schemas.microsoft.com/office/drawing/2014/main" id="{3224F13D-B5EE-4A89-B023-1C09CB045F5F}"/>
+                  </a:ext>
+                </a:extLst>
+              </p:cNvPr>
+              <p:cNvPicPr/>
+              <p:nvPr/>
+            </p:nvPicPr>
+            <p:blipFill>
+              <a:blip r:embed="rId11"/>
+              <a:stretch>
+                <a:fillRect/>
+              </a:stretch>
+            </p:blipFill>
+            <p:spPr>
+              <a:xfrm>
+                <a:off x="25654230" y="15070680"/>
+                <a:ext cx="18000" cy="18000"/>
+              </a:xfrm>
+              <a:prstGeom prst="rect">
+                <a:avLst/>
+              </a:prstGeom>
+            </p:spPr>
+          </p:pic>
+        </mc:Fallback>
+      </mc:AlternateContent>
+      <mc:AlternateContent xmlns:mc="http://schemas.openxmlformats.org/markup-compatibility/2006">
+        <mc:Choice xmlns:p14="http://schemas.microsoft.com/office/powerpoint/2010/main" Requires="p14">
+          <p:contentPart p14:bwMode="auto" r:id="rId12">
+            <p14:nvContentPartPr>
+              <p14:cNvPr id="10" name="Ink 9">
+                <a:extLst>
+                  <a:ext uri="{FF2B5EF4-FFF2-40B4-BE49-F238E27FC236}">
+                    <a16:creationId xmlns:a16="http://schemas.microsoft.com/office/drawing/2014/main" id="{2A338DF8-1472-46CB-ADF2-BB92C7B43EF5}"/>
+                  </a:ext>
+                </a:extLst>
+              </p14:cNvPr>
+              <p14:cNvContentPartPr/>
+              <p14:nvPr/>
+            </p14:nvContentPartPr>
+            <p14:xfrm>
+              <a:off x="-8273820" y="32463600"/>
+              <a:ext cx="503280" cy="253440"/>
+            </p14:xfrm>
+          </p:contentPart>
+        </mc:Choice>
+        <mc:Fallback>
+          <p:pic>
+            <p:nvPicPr>
+              <p:cNvPr id="10" name="Ink 9">
+                <a:extLst>
+                  <a:ext uri="{FF2B5EF4-FFF2-40B4-BE49-F238E27FC236}">
+                    <a16:creationId xmlns:a16="http://schemas.microsoft.com/office/drawing/2014/main" id="{2A338DF8-1472-46CB-ADF2-BB92C7B43EF5}"/>
+                  </a:ext>
+                </a:extLst>
+              </p:cNvPr>
+              <p:cNvPicPr/>
+              <p:nvPr/>
+            </p:nvPicPr>
+            <p:blipFill>
+              <a:blip r:embed="rId13"/>
+              <a:stretch>
+                <a:fillRect/>
+              </a:stretch>
+            </p:blipFill>
+            <p:spPr>
+              <a:xfrm>
+                <a:off x="-8282460" y="32454600"/>
+                <a:ext cx="520920" cy="271080"/>
+              </a:xfrm>
+              <a:prstGeom prst="rect">
+                <a:avLst/>
+              </a:prstGeom>
+            </p:spPr>
+          </p:pic>
+        </mc:Fallback>
+      </mc:AlternateContent>
+      <p:sp>
+        <p:nvSpPr>
+          <p:cNvPr id="42" name="TextBox 41">
+            <a:extLst>
+              <a:ext uri="{FF2B5EF4-FFF2-40B4-BE49-F238E27FC236}">
+                <a16:creationId xmlns:a16="http://schemas.microsoft.com/office/drawing/2014/main" id="{416D8817-2E39-408A-B4D8-D84E815E24AC}"/>
+              </a:ext>
+            </a:extLst>
+          </p:cNvPr>
+          <p:cNvSpPr txBox="1"/>
+          <p:nvPr/>
+        </p:nvSpPr>
+        <p:spPr>
+          <a:xfrm>
+            <a:off x="-31979118" y="1327849"/>
+            <a:ext cx="29715642" cy="892552"/>
+          </a:xfrm>
+          <a:prstGeom prst="rect">
+            <a:avLst/>
+          </a:prstGeom>
+          <a:noFill/>
+        </p:spPr>
+        <p:txBody>
+          <a:bodyPr wrap="square" rtlCol="0">
+            <a:spAutoFit/>
+          </a:bodyPr>
+          <a:lstStyle/>
+          <a:p>
+            <a:r>
+              <a:rPr lang="en-GB" sz="5200" dirty="0">
+                <a:latin typeface="Arial" panose="020B0604020202020204" pitchFamily="34" charset="0"/>
+                <a:cs typeface="Arial" panose="020B0604020202020204" pitchFamily="34" charset="0"/>
+              </a:rPr>
+              <a:t>Asymmetric heat and warm water volume fluxes arise despite symmetric El Niño and La Niña events</a:t>
+            </a:r>
+          </a:p>
+        </p:txBody>
+      </p:sp>
+      <p:pic>
+        <p:nvPicPr>
+          <p:cNvPr id="24" name="Picture 23">
+            <a:extLst>
+              <a:ext uri="{FF2B5EF4-FFF2-40B4-BE49-F238E27FC236}">
+                <a16:creationId xmlns:a16="http://schemas.microsoft.com/office/drawing/2014/main" id="{ACE3FB3A-AE93-490B-B47E-62AEF7B9C2D1}"/>
+              </a:ext>
+            </a:extLst>
+          </p:cNvPr>
+          <p:cNvPicPr>
+            <a:picLocks noChangeAspect="1"/>
+          </p:cNvPicPr>
+          <p:nvPr/>
+        </p:nvPicPr>
+        <p:blipFill rotWithShape="1">
+          <a:blip r:embed="rId14">
+            <a:extLst>
+              <a:ext uri="{28A0092B-C50C-407E-A947-70E740481C1C}">
+                <a14:useLocalDpi xmlns:a14="http://schemas.microsoft.com/office/drawing/2010/main" val="0"/>
+              </a:ext>
+            </a:extLst>
+          </a:blip>
+          <a:srcRect b="7179"/>
+          <a:stretch/>
+        </p:blipFill>
+        <p:spPr>
+          <a:xfrm>
+            <a:off x="377488" y="17369399"/>
+            <a:ext cx="29124753" cy="10261623"/>
+          </a:xfrm>
+          <a:prstGeom prst="rect">
+            <a:avLst/>
+          </a:prstGeom>
+        </p:spPr>
+      </p:pic>
+      <p:sp>
+        <p:nvSpPr>
+          <p:cNvPr id="45" name="TextBox 44">
+            <a:extLst>
+              <a:ext uri="{FF2B5EF4-FFF2-40B4-BE49-F238E27FC236}">
+                <a16:creationId xmlns:a16="http://schemas.microsoft.com/office/drawing/2014/main" id="{4B3C0EDF-69C3-4398-8A58-83C07D766827}"/>
+              </a:ext>
+            </a:extLst>
+          </p:cNvPr>
+          <p:cNvSpPr txBox="1"/>
+          <p:nvPr/>
+        </p:nvSpPr>
+        <p:spPr>
+          <a:xfrm>
+            <a:off x="441292" y="16577734"/>
+            <a:ext cx="17545914" cy="830997"/>
+          </a:xfrm>
+          <a:prstGeom prst="rect">
+            <a:avLst/>
+          </a:prstGeom>
+          <a:noFill/>
+        </p:spPr>
+        <p:txBody>
+          <a:bodyPr wrap="square" rtlCol="0">
+            <a:spAutoFit/>
+          </a:bodyPr>
+          <a:lstStyle/>
+          <a:p>
+            <a:r>
+              <a:rPr lang="en-GB" sz="4800" dirty="0">
+                <a:latin typeface="Arial" panose="020B0604020202020204" pitchFamily="34" charset="0"/>
+                <a:cs typeface="Arial" panose="020B0604020202020204" pitchFamily="34" charset="0"/>
+              </a:rPr>
+              <a:t>a) adiabatic fluxes changing WWV</a:t>
+            </a:r>
+          </a:p>
+        </p:txBody>
+      </p:sp>
+      <p:sp>
+        <p:nvSpPr>
+          <p:cNvPr id="46" name="TextBox 45">
+            <a:extLst>
+              <a:ext uri="{FF2B5EF4-FFF2-40B4-BE49-F238E27FC236}">
+                <a16:creationId xmlns:a16="http://schemas.microsoft.com/office/drawing/2014/main" id="{B1871DF4-318D-4048-BB5D-FBFFBF70F4C2}"/>
+              </a:ext>
+            </a:extLst>
+          </p:cNvPr>
+          <p:cNvSpPr txBox="1"/>
+          <p:nvPr/>
+        </p:nvSpPr>
+        <p:spPr>
+          <a:xfrm>
+            <a:off x="441292" y="22009931"/>
+            <a:ext cx="17545914" cy="830997"/>
+          </a:xfrm>
+          <a:prstGeom prst="rect">
+            <a:avLst/>
+          </a:prstGeom>
+          <a:noFill/>
+        </p:spPr>
+        <p:txBody>
+          <a:bodyPr wrap="square" rtlCol="0">
+            <a:spAutoFit/>
+          </a:bodyPr>
+          <a:lstStyle/>
+          <a:p>
+            <a:r>
+              <a:rPr lang="en-GB" sz="4800" dirty="0">
+                <a:latin typeface="Arial" panose="020B0604020202020204" pitchFamily="34" charset="0"/>
+                <a:cs typeface="Arial" panose="020B0604020202020204" pitchFamily="34" charset="0"/>
+              </a:rPr>
+              <a:t>b) diabatic fluxes changing WWV</a:t>
+            </a:r>
+          </a:p>
+        </p:txBody>
+      </p:sp>
+      <p:sp>
+        <p:nvSpPr>
+          <p:cNvPr id="28" name="Rectangle 27">
+            <a:extLst>
+              <a:ext uri="{FF2B5EF4-FFF2-40B4-BE49-F238E27FC236}">
+                <a16:creationId xmlns:a16="http://schemas.microsoft.com/office/drawing/2014/main" id="{84E6E7FE-1D68-43AF-B71F-CFF3B93B0850}"/>
+              </a:ext>
+            </a:extLst>
+          </p:cNvPr>
+          <p:cNvSpPr/>
+          <p:nvPr/>
+        </p:nvSpPr>
+        <p:spPr>
+          <a:xfrm>
+            <a:off x="428668" y="39410821"/>
+            <a:ext cx="29202218" cy="3046988"/>
+          </a:xfrm>
+          <a:prstGeom prst="rect">
+            <a:avLst/>
+          </a:prstGeom>
+        </p:spPr>
+        <p:txBody>
+          <a:bodyPr wrap="square">
+            <a:spAutoFit/>
+          </a:bodyPr>
+          <a:lstStyle/>
+          <a:p>
+            <a:r>
+              <a:rPr lang="en-GB" sz="4800" dirty="0">
+                <a:latin typeface="Arial" panose="020B0604020202020204" pitchFamily="34" charset="0"/>
+                <a:cs typeface="Arial" panose="020B0604020202020204" pitchFamily="34" charset="0"/>
+              </a:rPr>
+              <a:t>Method: </a:t>
+            </a:r>
+          </a:p>
+          <a:p>
+            <a:pPr marL="685800" indent="-685800">
+              <a:buFont typeface="Arial" panose="020B0604020202020204" pitchFamily="34" charset="0"/>
+              <a:buChar char="•"/>
+            </a:pPr>
+            <a:r>
+              <a:rPr lang="en-GB" sz="4800" dirty="0">
+                <a:latin typeface="Arial" panose="020B0604020202020204" pitchFamily="34" charset="0"/>
+                <a:cs typeface="Arial" panose="020B0604020202020204" pitchFamily="34" charset="0"/>
+              </a:rPr>
+              <a:t>simulating ENSO events in MOM5 / ACCESS-OM2, ¼° global ocean, sea ice models with 50 vertical depth levels and CORE-NYF + ERA-Interim / JRA55 forcing</a:t>
+            </a:r>
+          </a:p>
+          <a:p>
+            <a:pPr marL="685800" indent="-685800">
+              <a:buFont typeface="Arial" panose="020B0604020202020204" pitchFamily="34" charset="0"/>
+              <a:buChar char="•"/>
+            </a:pPr>
+            <a:r>
+              <a:rPr lang="en-GB" sz="4800" dirty="0">
+                <a:latin typeface="Arial" panose="020B0604020202020204" pitchFamily="34" charset="0"/>
+                <a:cs typeface="Arial" panose="020B0604020202020204" pitchFamily="34" charset="0"/>
+              </a:rPr>
+              <a:t>using the Water Mass Transformation framework to analyse the WWV balance terms</a:t>
+            </a:r>
+          </a:p>
+        </p:txBody>
+      </p:sp>
+      <p:pic>
+        <p:nvPicPr>
+          <p:cNvPr id="30" name="Picture 29" descr="A close up of a map&#10;&#10;Description automatically generated">
+            <a:extLst>
+              <a:ext uri="{FF2B5EF4-FFF2-40B4-BE49-F238E27FC236}">
+                <a16:creationId xmlns:a16="http://schemas.microsoft.com/office/drawing/2014/main" id="{57A6BAB8-7085-409C-A9B3-2CFD332B7162}"/>
+              </a:ext>
+            </a:extLst>
+          </p:cNvPr>
+          <p:cNvPicPr>
+            <a:picLocks noChangeAspect="1"/>
+          </p:cNvPicPr>
+          <p:nvPr/>
+        </p:nvPicPr>
+        <p:blipFill rotWithShape="1">
+          <a:blip r:embed="rId15" cstate="print">
+            <a:extLst>
+              <a:ext uri="{28A0092B-C50C-407E-A947-70E740481C1C}">
+                <a14:useLocalDpi xmlns:a14="http://schemas.microsoft.com/office/drawing/2010/main" val="0"/>
+              </a:ext>
+            </a:extLst>
+          </a:blip>
+          <a:srcRect l="4667"/>
+          <a:stretch/>
+        </p:blipFill>
+        <p:spPr>
+          <a:xfrm>
+            <a:off x="15450217" y="30385100"/>
+            <a:ext cx="14263292" cy="7482114"/>
+          </a:xfrm>
+          <a:prstGeom prst="rect">
+            <a:avLst/>
+          </a:prstGeom>
+        </p:spPr>
+      </p:pic>
     </p:spTree>
     <p:extLst>
       <p:ext uri="{BB962C8B-B14F-4D97-AF65-F5344CB8AC3E}">
@@ -6219,4 +6498,219 @@
     </a:ext>
   </a:extLst>
 </a:theme>
+</file>
+
+<file path=customXml/item1.xml><?xml version="1.0" encoding="utf-8"?>
+<ct:contentTypeSchema xmlns:ct="http://schemas.microsoft.com/office/2006/metadata/contentType" xmlns:ma="http://schemas.microsoft.com/office/2006/metadata/properties/metaAttributes" ct:_="" ma:_="" ma:contentTypeName="Document" ma:contentTypeID="0x01010055EF6BBE312FEB4D82AAE6E17BDA5126" ma:contentTypeVersion="6" ma:contentTypeDescription="Create a new document." ma:contentTypeScope="" ma:versionID="1c9ff379a8556a6d726efb775621987a">
+  <xsd:schema xmlns:xsd="http://www.w3.org/2001/XMLSchema" xmlns:xs="http://www.w3.org/2001/XMLSchema" xmlns:p="http://schemas.microsoft.com/office/2006/metadata/properties" xmlns:ns3="55b9330c-b65e-4278-87f6-c99b13caa9a6" targetNamespace="http://schemas.microsoft.com/office/2006/metadata/properties" ma:root="true" ma:fieldsID="b8a364a476f1d9203dc5bd6398e56b59" ns3:_="">
+    <xsd:import namespace="55b9330c-b65e-4278-87f6-c99b13caa9a6"/>
+    <xsd:element name="properties">
+      <xsd:complexType>
+        <xsd:sequence>
+          <xsd:element name="documentManagement">
+            <xsd:complexType>
+              <xsd:all>
+                <xsd:element ref="ns3:MediaServiceMetadata" minOccurs="0"/>
+                <xsd:element ref="ns3:MediaServiceFastMetadata" minOccurs="0"/>
+                <xsd:element ref="ns3:MediaServiceAutoTags" minOccurs="0"/>
+                <xsd:element ref="ns3:MediaServiceGenerationTime" minOccurs="0"/>
+                <xsd:element ref="ns3:MediaServiceEventHashCode" minOccurs="0"/>
+                <xsd:element ref="ns3:MediaServiceOCR" minOccurs="0"/>
+              </xsd:all>
+            </xsd:complexType>
+          </xsd:element>
+        </xsd:sequence>
+      </xsd:complexType>
+    </xsd:element>
+  </xsd:schema>
+  <xsd:schema xmlns:xsd="http://www.w3.org/2001/XMLSchema" xmlns:xs="http://www.w3.org/2001/XMLSchema" xmlns:dms="http://schemas.microsoft.com/office/2006/documentManagement/types" xmlns:pc="http://schemas.microsoft.com/office/infopath/2007/PartnerControls" targetNamespace="55b9330c-b65e-4278-87f6-c99b13caa9a6" elementFormDefault="qualified">
+    <xsd:import namespace="http://schemas.microsoft.com/office/2006/documentManagement/types"/>
+    <xsd:import namespace="http://schemas.microsoft.com/office/infopath/2007/PartnerControls"/>
+    <xsd:element name="MediaServiceMetadata" ma:index="8" nillable="true" ma:displayName="MediaServiceMetadata" ma:hidden="true" ma:internalName="MediaServiceMetadata" ma:readOnly="true">
+      <xsd:simpleType>
+        <xsd:restriction base="dms:Note"/>
+      </xsd:simpleType>
+    </xsd:element>
+    <xsd:element name="MediaServiceFastMetadata" ma:index="9" nillable="true" ma:displayName="MediaServiceFastMetadata" ma:hidden="true" ma:internalName="MediaServiceFastMetadata" ma:readOnly="true">
+      <xsd:simpleType>
+        <xsd:restriction base="dms:Note"/>
+      </xsd:simpleType>
+    </xsd:element>
+    <xsd:element name="MediaServiceAutoTags" ma:index="10" nillable="true" ma:displayName="Tags" ma:internalName="MediaServiceAutoTags" ma:readOnly="true">
+      <xsd:simpleType>
+        <xsd:restriction base="dms:Text"/>
+      </xsd:simpleType>
+    </xsd:element>
+    <xsd:element name="MediaServiceGenerationTime" ma:index="11" nillable="true" ma:displayName="MediaServiceGenerationTime" ma:hidden="true" ma:internalName="MediaServiceGenerationTime" ma:readOnly="true">
+      <xsd:simpleType>
+        <xsd:restriction base="dms:Text"/>
+      </xsd:simpleType>
+    </xsd:element>
+    <xsd:element name="MediaServiceEventHashCode" ma:index="12" nillable="true" ma:displayName="MediaServiceEventHashCode" ma:hidden="true" ma:internalName="MediaServiceEventHashCode" ma:readOnly="true">
+      <xsd:simpleType>
+        <xsd:restriction base="dms:Text"/>
+      </xsd:simpleType>
+    </xsd:element>
+    <xsd:element name="MediaServiceOCR" ma:index="13" nillable="true" ma:displayName="Extracted Text" ma:internalName="MediaServiceOCR" ma:readOnly="true">
+      <xsd:simpleType>
+        <xsd:restriction base="dms:Note">
+          <xsd:maxLength value="255"/>
+        </xsd:restriction>
+      </xsd:simpleType>
+    </xsd:element>
+  </xsd:schema>
+  <xsd:schema xmlns="http://schemas.openxmlformats.org/package/2006/metadata/core-properties" xmlns:xsd="http://www.w3.org/2001/XMLSchema" xmlns:xsi="http://www.w3.org/2001/XMLSchema-instance" xmlns:dc="http://purl.org/dc/elements/1.1/" xmlns:dcterms="http://purl.org/dc/terms/" xmlns:odoc="http://schemas.microsoft.com/internal/obd" targetNamespace="http://schemas.openxmlformats.org/package/2006/metadata/core-properties" elementFormDefault="qualified" attributeFormDefault="unqualified" blockDefault="#all">
+    <xsd:import namespace="http://purl.org/dc/elements/1.1/" schemaLocation="http://dublincore.org/schemas/xmls/qdc/2003/04/02/dc.xsd"/>
+    <xsd:import namespace="http://purl.org/dc/terms/" schemaLocation="http://dublincore.org/schemas/xmls/qdc/2003/04/02/dcterms.xsd"/>
+    <xsd:element name="coreProperties" type="CT_coreProperties"/>
+    <xsd:complexType name="CT_coreProperties">
+      <xsd:all>
+        <xsd:element ref="dc:creator" minOccurs="0" maxOccurs="1"/>
+        <xsd:element ref="dcterms:created" minOccurs="0" maxOccurs="1"/>
+        <xsd:element ref="dc:identifier" minOccurs="0" maxOccurs="1"/>
+        <xsd:element name="contentType" minOccurs="0" maxOccurs="1" type="xsd:string" ma:index="0" ma:displayName="Content Type"/>
+        <xsd:element ref="dc:title" minOccurs="0" maxOccurs="1" ma:index="4" ma:displayName="Title"/>
+        <xsd:element ref="dc:subject" minOccurs="0" maxOccurs="1"/>
+        <xsd:element ref="dc:description" minOccurs="0" maxOccurs="1"/>
+        <xsd:element name="keywords" minOccurs="0" maxOccurs="1" type="xsd:string"/>
+        <xsd:element ref="dc:language" minOccurs="0" maxOccurs="1"/>
+        <xsd:element name="category" minOccurs="0" maxOccurs="1" type="xsd:string"/>
+        <xsd:element name="version" minOccurs="0" maxOccurs="1" type="xsd:string"/>
+        <xsd:element name="revision" minOccurs="0" maxOccurs="1" type="xsd:string">
+          <xsd:annotation>
+            <xsd:documentation>
+                        This value indicates the number of saves or revisions. The application is responsible for updating this value after each revision.
+                    </xsd:documentation>
+          </xsd:annotation>
+        </xsd:element>
+        <xsd:element name="lastModifiedBy" minOccurs="0" maxOccurs="1" type="xsd:string"/>
+        <xsd:element ref="dcterms:modified" minOccurs="0" maxOccurs="1"/>
+        <xsd:element name="contentStatus" minOccurs="0" maxOccurs="1" type="xsd:string"/>
+      </xsd:all>
+    </xsd:complexType>
+  </xsd:schema>
+  <xs:schema xmlns:pc="http://schemas.microsoft.com/office/infopath/2007/PartnerControls" xmlns:xs="http://www.w3.org/2001/XMLSchema" targetNamespace="http://schemas.microsoft.com/office/infopath/2007/PartnerControls" elementFormDefault="qualified" attributeFormDefault="unqualified">
+    <xs:element name="Person">
+      <xs:complexType>
+        <xs:sequence>
+          <xs:element ref="pc:DisplayName" minOccurs="0"/>
+          <xs:element ref="pc:AccountId" minOccurs="0"/>
+          <xs:element ref="pc:AccountType" minOccurs="0"/>
+        </xs:sequence>
+      </xs:complexType>
+    </xs:element>
+    <xs:element name="DisplayName" type="xs:string"/>
+    <xs:element name="AccountId" type="xs:string"/>
+    <xs:element name="AccountType" type="xs:string"/>
+    <xs:element name="BDCAssociatedEntity">
+      <xs:complexType>
+        <xs:sequence>
+          <xs:element ref="pc:BDCEntity" minOccurs="0" maxOccurs="unbounded"/>
+        </xs:sequence>
+        <xs:attribute ref="pc:EntityNamespace"/>
+        <xs:attribute ref="pc:EntityName"/>
+        <xs:attribute ref="pc:SystemInstanceName"/>
+        <xs:attribute ref="pc:AssociationName"/>
+      </xs:complexType>
+    </xs:element>
+    <xs:attribute name="EntityNamespace" type="xs:string"/>
+    <xs:attribute name="EntityName" type="xs:string"/>
+    <xs:attribute name="SystemInstanceName" type="xs:string"/>
+    <xs:attribute name="AssociationName" type="xs:string"/>
+    <xs:element name="BDCEntity">
+      <xs:complexType>
+        <xs:sequence>
+          <xs:element ref="pc:EntityDisplayName" minOccurs="0"/>
+          <xs:element ref="pc:EntityInstanceReference" minOccurs="0"/>
+          <xs:element ref="pc:EntityId1" minOccurs="0"/>
+          <xs:element ref="pc:EntityId2" minOccurs="0"/>
+          <xs:element ref="pc:EntityId3" minOccurs="0"/>
+          <xs:element ref="pc:EntityId4" minOccurs="0"/>
+          <xs:element ref="pc:EntityId5" minOccurs="0"/>
+        </xs:sequence>
+      </xs:complexType>
+    </xs:element>
+    <xs:element name="EntityDisplayName" type="xs:string"/>
+    <xs:element name="EntityInstanceReference" type="xs:string"/>
+    <xs:element name="EntityId1" type="xs:string"/>
+    <xs:element name="EntityId2" type="xs:string"/>
+    <xs:element name="EntityId3" type="xs:string"/>
+    <xs:element name="EntityId4" type="xs:string"/>
+    <xs:element name="EntityId5" type="xs:string"/>
+    <xs:element name="Terms">
+      <xs:complexType>
+        <xs:sequence>
+          <xs:element ref="pc:TermInfo" minOccurs="0" maxOccurs="unbounded"/>
+        </xs:sequence>
+      </xs:complexType>
+    </xs:element>
+    <xs:element name="TermInfo">
+      <xs:complexType>
+        <xs:sequence>
+          <xs:element ref="pc:TermName" minOccurs="0"/>
+          <xs:element ref="pc:TermId" minOccurs="0"/>
+        </xs:sequence>
+      </xs:complexType>
+    </xs:element>
+    <xs:element name="TermName" type="xs:string"/>
+    <xs:element name="TermId" type="xs:string"/>
+  </xs:schema>
+</ct:contentTypeSchema>
+</file>
+
+<file path=customXml/item2.xml><?xml version="1.0" encoding="utf-8"?>
+<?mso-contentType ?>
+<FormTemplates xmlns="http://schemas.microsoft.com/sharepoint/v3/contenttype/forms">
+  <Display>DocumentLibraryForm</Display>
+  <Edit>DocumentLibraryForm</Edit>
+  <New>DocumentLibraryForm</New>
+</FormTemplates>
+</file>
+
+<file path=customXml/item3.xml><?xml version="1.0" encoding="utf-8"?>
+<p:properties xmlns:p="http://schemas.microsoft.com/office/2006/metadata/properties" xmlns:xsi="http://www.w3.org/2001/XMLSchema-instance" xmlns:pc="http://schemas.microsoft.com/office/infopath/2007/PartnerControls">
+  <documentManagement/>
+</p:properties>
+</file>
+
+<file path=customXml/itemProps1.xml><?xml version="1.0" encoding="utf-8"?>
+<ds:datastoreItem xmlns:ds="http://schemas.openxmlformats.org/officeDocument/2006/customXml" ds:itemID="{AD33B81E-0435-4EEA-BA2F-61D5E68D7B6F}">
+  <ds:schemaRefs>
+    <ds:schemaRef ds:uri="http://schemas.microsoft.com/office/2006/metadata/contentType"/>
+    <ds:schemaRef ds:uri="http://schemas.microsoft.com/office/2006/metadata/properties/metaAttributes"/>
+    <ds:schemaRef ds:uri="http://www.w3.org/2001/XMLSchema"/>
+    <ds:schemaRef ds:uri="http://schemas.microsoft.com/office/2006/metadata/properties"/>
+    <ds:schemaRef ds:uri="55b9330c-b65e-4278-87f6-c99b13caa9a6"/>
+    <ds:schemaRef ds:uri="http://schemas.microsoft.com/office/2006/documentManagement/types"/>
+    <ds:schemaRef ds:uri="http://schemas.microsoft.com/office/infopath/2007/PartnerControls"/>
+    <ds:schemaRef ds:uri="http://schemas.openxmlformats.org/package/2006/metadata/core-properties"/>
+    <ds:schemaRef ds:uri="http://purl.org/dc/elements/1.1/"/>
+    <ds:schemaRef ds:uri="http://purl.org/dc/terms/"/>
+    <ds:schemaRef ds:uri="http://schemas.microsoft.com/internal/obd"/>
+  </ds:schemaRefs>
+</ds:datastoreItem>
+</file>
+
+<file path=customXml/itemProps2.xml><?xml version="1.0" encoding="utf-8"?>
+<ds:datastoreItem xmlns:ds="http://schemas.openxmlformats.org/officeDocument/2006/customXml" ds:itemID="{E5A3562A-7909-4CE7-AB00-E98362C1F4FB}">
+  <ds:schemaRefs>
+    <ds:schemaRef ds:uri="http://schemas.microsoft.com/sharepoint/v3/contenttype/forms"/>
+  </ds:schemaRefs>
+</ds:datastoreItem>
+</file>
+
+<file path=customXml/itemProps3.xml><?xml version="1.0" encoding="utf-8"?>
+<ds:datastoreItem xmlns:ds="http://schemas.openxmlformats.org/officeDocument/2006/customXml" ds:itemID="{726E48BB-F264-4B8D-AFB3-ED7A7FB3EA56}">
+  <ds:schemaRefs>
+    <ds:schemaRef ds:uri="http://purl.org/dc/dcmitype/"/>
+    <ds:schemaRef ds:uri="http://schemas.microsoft.com/office/2006/metadata/properties"/>
+    <ds:schemaRef ds:uri="http://schemas.microsoft.com/office/infopath/2007/PartnerControls"/>
+    <ds:schemaRef ds:uri="http://purl.org/dc/terms/"/>
+    <ds:schemaRef ds:uri="http://schemas.microsoft.com/office/2006/documentManagement/types"/>
+    <ds:schemaRef ds:uri="http://purl.org/dc/elements/1.1/"/>
+    <ds:schemaRef ds:uri="http://www.w3.org/XML/1998/namespace"/>
+    <ds:schemaRef ds:uri="http://schemas.openxmlformats.org/package/2006/metadata/core-properties"/>
+    <ds:schemaRef ds:uri="55b9330c-b65e-4278-87f6-c99b13caa9a6"/>
+  </ds:schemaRefs>
+</ds:datastoreItem>
 </file>
</xml_diff>

<commit_message>
uploading clex poster final version
</commit_message>
<xml_diff>
--- a/presentations/poster_clex_workshop_maurice_huguenin_2019.pptx
+++ b/presentations/poster_clex_workshop_maurice_huguenin_2019.pptx
@@ -211,7 +211,7 @@
           <a:p>
             <a:fld id="{D60A1517-57FD-4E08-9190-27AEEFFFA986}" type="datetimeFigureOut">
               <a:rPr lang="en-US" smtClean="0"/>
-              <a:t>11/13/2019</a:t>
+              <a:t>11/14/2019</a:t>
             </a:fld>
             <a:endParaRPr lang="en-US"/>
           </a:p>
@@ -337,14 +337,41 @@
           <inkml:channelProperty channel="F" name="resolution" value="0" units="1/dev"/>
         </inkml:channelProperties>
       </inkml:inkSource>
-      <inkml:timestamp xml:id="ts0" timeString="2019-11-13T03:57:13.752"/>
+      <inkml:timestamp xml:id="ts0" timeString="2019-11-14T02:55:05.398"/>
     </inkml:context>
     <inkml:brush xml:id="br0">
       <inkml:brushProperty name="width" value="0.05" units="cm"/>
       <inkml:brushProperty name="height" value="0.05" units="cm"/>
     </inkml:brush>
   </inkml:definitions>
-  <inkml:trace contextRef="#ctx0" brushRef="#br0">1 703 4,'372'-185'0,"653"-333"0</inkml:trace>
+  <inkml:trace contextRef="#ctx0" brushRef="#br0">0 1 4</inkml:trace>
+</inkml:ink>
+</file>
+
+<file path=ppt/ink/ink3.xml><?xml version="1.0" encoding="utf-8"?>
+<inkml:ink xmlns:inkml="http://www.w3.org/2003/InkML">
+  <inkml:definitions>
+    <inkml:context xml:id="ctx0">
+      <inkml:inkSource xml:id="inkSrc0">
+        <inkml:traceFormat>
+          <inkml:channel name="X" type="integer" min="-2.14748E9" max="2.14748E9" units="cm"/>
+          <inkml:channel name="Y" type="integer" min="-2.14748E9" max="2.14748E9" units="cm"/>
+          <inkml:channel name="F" type="integer" max="32767" units="dev"/>
+        </inkml:traceFormat>
+        <inkml:channelProperties>
+          <inkml:channelProperty channel="X" name="resolution" value="1000" units="1/cm"/>
+          <inkml:channelProperty channel="Y" name="resolution" value="1000" units="1/cm"/>
+          <inkml:channelProperty channel="F" name="resolution" value="0" units="1/dev"/>
+        </inkml:channelProperties>
+      </inkml:inkSource>
+      <inkml:timestamp xml:id="ts0" timeString="2019-11-14T03:43:09.091"/>
+    </inkml:context>
+    <inkml:brush xml:id="br0">
+      <inkml:brushProperty name="width" value="0.05" units="cm"/>
+      <inkml:brushProperty name="height" value="0.05" units="cm"/>
+    </inkml:brush>
+  </inkml:definitions>
+  <inkml:trace contextRef="#ctx0" brushRef="#br0">0 55 4,'56'-30'4,"-6"30"0,48 0 0,14-24-4</inkml:trace>
 </inkml:ink>
 </file>
 
@@ -430,7 +457,7 @@
           <a:p>
             <a:fld id="{FE88F1A9-1491-4A4B-9B77-13A01D10A0FF}" type="datetimeFigureOut">
               <a:rPr lang="en-US" smtClean="0"/>
-              <a:t>11/13/2019</a:t>
+              <a:t>11/14/2019</a:t>
             </a:fld>
             <a:endParaRPr lang="en-US"/>
           </a:p>
@@ -917,7 +944,7 @@
           <a:p>
             <a:fld id="{819FB65F-77A9-44EE-854A-5630BF17D415}" type="datetimeFigureOut">
               <a:rPr lang="en-US" smtClean="0"/>
-              <a:t>11/13/2019</a:t>
+              <a:t>11/14/2019</a:t>
             </a:fld>
             <a:endParaRPr lang="en-US"/>
           </a:p>
@@ -1087,7 +1114,7 @@
           <a:p>
             <a:fld id="{819FB65F-77A9-44EE-854A-5630BF17D415}" type="datetimeFigureOut">
               <a:rPr lang="en-US" smtClean="0"/>
-              <a:t>11/13/2019</a:t>
+              <a:t>11/14/2019</a:t>
             </a:fld>
             <a:endParaRPr lang="en-US"/>
           </a:p>
@@ -1267,7 +1294,7 @@
           <a:p>
             <a:fld id="{819FB65F-77A9-44EE-854A-5630BF17D415}" type="datetimeFigureOut">
               <a:rPr lang="en-US" smtClean="0"/>
-              <a:t>11/13/2019</a:t>
+              <a:t>11/14/2019</a:t>
             </a:fld>
             <a:endParaRPr lang="en-US"/>
           </a:p>
@@ -1437,7 +1464,7 @@
           <a:p>
             <a:fld id="{819FB65F-77A9-44EE-854A-5630BF17D415}" type="datetimeFigureOut">
               <a:rPr lang="en-US" smtClean="0"/>
-              <a:t>11/13/2019</a:t>
+              <a:t>11/14/2019</a:t>
             </a:fld>
             <a:endParaRPr lang="en-US"/>
           </a:p>
@@ -1681,7 +1708,7 @@
           <a:p>
             <a:fld id="{819FB65F-77A9-44EE-854A-5630BF17D415}" type="datetimeFigureOut">
               <a:rPr lang="en-US" smtClean="0"/>
-              <a:t>11/13/2019</a:t>
+              <a:t>11/14/2019</a:t>
             </a:fld>
             <a:endParaRPr lang="en-US"/>
           </a:p>
@@ -1913,7 +1940,7 @@
           <a:p>
             <a:fld id="{819FB65F-77A9-44EE-854A-5630BF17D415}" type="datetimeFigureOut">
               <a:rPr lang="en-US" smtClean="0"/>
-              <a:t>11/13/2019</a:t>
+              <a:t>11/14/2019</a:t>
             </a:fld>
             <a:endParaRPr lang="en-US"/>
           </a:p>
@@ -2280,7 +2307,7 @@
           <a:p>
             <a:fld id="{819FB65F-77A9-44EE-854A-5630BF17D415}" type="datetimeFigureOut">
               <a:rPr lang="en-US" smtClean="0"/>
-              <a:t>11/13/2019</a:t>
+              <a:t>11/14/2019</a:t>
             </a:fld>
             <a:endParaRPr lang="en-US"/>
           </a:p>
@@ -2398,7 +2425,7 @@
           <a:p>
             <a:fld id="{819FB65F-77A9-44EE-854A-5630BF17D415}" type="datetimeFigureOut">
               <a:rPr lang="en-US" smtClean="0"/>
-              <a:t>11/13/2019</a:t>
+              <a:t>11/14/2019</a:t>
             </a:fld>
             <a:endParaRPr lang="en-US"/>
           </a:p>
@@ -2493,7 +2520,7 @@
           <a:p>
             <a:fld id="{819FB65F-77A9-44EE-854A-5630BF17D415}" type="datetimeFigureOut">
               <a:rPr lang="en-US" smtClean="0"/>
-              <a:t>11/13/2019</a:t>
+              <a:t>11/14/2019</a:t>
             </a:fld>
             <a:endParaRPr lang="en-US"/>
           </a:p>
@@ -2770,7 +2797,7 @@
           <a:p>
             <a:fld id="{819FB65F-77A9-44EE-854A-5630BF17D415}" type="datetimeFigureOut">
               <a:rPr lang="en-US" smtClean="0"/>
-              <a:t>11/13/2019</a:t>
+              <a:t>11/14/2019</a:t>
             </a:fld>
             <a:endParaRPr lang="en-US"/>
           </a:p>
@@ -3027,7 +3054,7 @@
           <a:p>
             <a:fld id="{819FB65F-77A9-44EE-854A-5630BF17D415}" type="datetimeFigureOut">
               <a:rPr lang="en-US" smtClean="0"/>
-              <a:t>11/13/2019</a:t>
+              <a:t>11/14/2019</a:t>
             </a:fld>
             <a:endParaRPr lang="en-US"/>
           </a:p>
@@ -3240,7 +3267,7 @@
           <a:p>
             <a:fld id="{819FB65F-77A9-44EE-854A-5630BF17D415}" type="datetimeFigureOut">
               <a:rPr lang="en-US" smtClean="0"/>
-              <a:t>11/13/2019</a:t>
+              <a:t>11/14/2019</a:t>
             </a:fld>
             <a:endParaRPr lang="en-US"/>
           </a:p>
@@ -4126,7 +4153,7 @@
                 <a:latin typeface="Arial" panose="020B0604020202020204" pitchFamily="34" charset="0"/>
                 <a:cs typeface="Arial" panose="020B0604020202020204" pitchFamily="34" charset="0"/>
               </a:rPr>
-              <a:t>         link to .PDF</a:t>
+              <a:t>                     </a:t>
             </a:r>
           </a:p>
         </p:txBody>
@@ -4145,8 +4172,8 @@
         </p:nvSpPr>
         <p:spPr>
           <a:xfrm>
-            <a:off x="182082" y="6575714"/>
-            <a:ext cx="29715643" cy="22934640"/>
+            <a:off x="182082" y="9729732"/>
+            <a:ext cx="29715643" cy="22126259"/>
           </a:xfrm>
           <a:prstGeom prst="roundRect">
             <a:avLst>
@@ -4204,8 +4231,8 @@
         </p:nvSpPr>
         <p:spPr>
           <a:xfrm>
-            <a:off x="182081" y="29825833"/>
-            <a:ext cx="29715643" cy="12687297"/>
+            <a:off x="182081" y="32115001"/>
+            <a:ext cx="29715644" cy="10398129"/>
           </a:xfrm>
           <a:prstGeom prst="roundRect">
             <a:avLst>
@@ -4277,7 +4304,7 @@
         </p:blipFill>
         <p:spPr>
           <a:xfrm>
-            <a:off x="704781" y="3940762"/>
+            <a:off x="704781" y="3839164"/>
             <a:ext cx="5574236" cy="2359761"/>
           </a:xfrm>
           <a:prstGeom prst="rect">
@@ -4359,8 +4386,8 @@
         </p:blipFill>
         <p:spPr>
           <a:xfrm>
-            <a:off x="13165758" y="4519225"/>
-            <a:ext cx="1436262" cy="1436262"/>
+            <a:off x="13253997" y="4477783"/>
+            <a:ext cx="1785905" cy="1785905"/>
           </a:xfrm>
           <a:prstGeom prst="rect">
             <a:avLst/>
@@ -4381,8 +4408,8 @@
         </p:nvSpPr>
         <p:spPr>
           <a:xfrm>
-            <a:off x="317758" y="30307251"/>
-            <a:ext cx="14850431" cy="7478970"/>
+            <a:off x="285660" y="32862621"/>
+            <a:ext cx="14556832" cy="8586966"/>
           </a:xfrm>
           <a:prstGeom prst="rect">
             <a:avLst/>
@@ -4395,13 +4422,13 @@
           </a:bodyPr>
           <a:lstStyle/>
           <a:p>
-            <a:pPr algn="just"/>
-            <a:r>
-              <a:rPr lang="en-GB" sz="4800" dirty="0">
+            <a:pPr algn="ctr"/>
+            <a:r>
+              <a:rPr lang="en-GB" sz="7200" dirty="0">
                 <a:latin typeface="Arial" panose="020B0604020202020204" pitchFamily="34" charset="0"/>
                 <a:cs typeface="Arial" panose="020B0604020202020204" pitchFamily="34" charset="0"/>
               </a:rPr>
-              <a:t>Take Home Messages:</a:t>
+              <a:t>Take Home Messages</a:t>
             </a:r>
           </a:p>
           <a:p>
@@ -4459,8 +4486,8 @@
         </p:nvSpPr>
         <p:spPr>
           <a:xfrm>
-            <a:off x="285660" y="13529753"/>
-            <a:ext cx="29216582" cy="3046988"/>
+            <a:off x="285660" y="16528531"/>
+            <a:ext cx="29216582" cy="1569660"/>
           </a:xfrm>
           <a:prstGeom prst="rect">
             <a:avLst/>
@@ -4486,7 +4513,7 @@
                 <a:latin typeface="Arial" panose="020B0604020202020204" pitchFamily="34" charset="0"/>
                 <a:cs typeface="Arial" panose="020B0604020202020204" pitchFamily="34" charset="0"/>
               </a:rPr>
-              <a:t>Schematics representing the discharge and recharge phases of Warm Water Volume (WWV)  during idealised symmetric (a) El Niño and (b) La Niña events in the MOM5 model. WWV as the volume of water above 20°C is a proxy for the equatorial Pacific’s upper ocean heat content and a key inclusion in ENSO forecasting. The overall contribution of each flux is given as a unit of 10</a:t>
+              <a:t>Schematics representing the discharge and recharge phases of WWV during idealised symmetric (a) El Niño and (b) La Niña events in MOM5. The overall contribution of each flux is given as a unit of 10</a:t>
             </a:r>
             <a:r>
               <a:rPr lang="en-GB" sz="4800" baseline="30000" dirty="0">
@@ -4533,15 +4560,15 @@
         </p:nvGrpSpPr>
         <p:grpSpPr>
           <a:xfrm>
-            <a:off x="222693" y="6892827"/>
-            <a:ext cx="29510436" cy="6945291"/>
-            <a:chOff x="321757" y="10233780"/>
-            <a:chExt cx="29510436" cy="6945291"/>
+            <a:off x="531173" y="9950639"/>
+            <a:ext cx="28975460" cy="6474469"/>
+            <a:chOff x="935037" y="10096872"/>
+            <a:chExt cx="28975460" cy="6474469"/>
           </a:xfrm>
         </p:grpSpPr>
         <p:pic>
           <p:nvPicPr>
-            <p:cNvPr id="4" name="Picture 3" descr="A picture containing text, map&#10;&#10;Description automatically generated">
+            <p:cNvPr id="4" name="Picture 3">
               <a:extLst>
                 <a:ext uri="{FF2B5EF4-FFF2-40B4-BE49-F238E27FC236}">
                   <a16:creationId xmlns:a16="http://schemas.microsoft.com/office/drawing/2014/main" id="{E9D8AB2E-C3E1-49E7-A635-9D3A257C8CAE}"/>
@@ -4561,13 +4588,13 @@
                 </a:ext>
               </a:extLst>
             </a:blip>
-            <a:srcRect b="48121"/>
+            <a:srcRect t="13785" b="633"/>
             <a:stretch/>
           </p:blipFill>
           <p:spPr>
             <a:xfrm>
-              <a:off x="321757" y="10283491"/>
-              <a:ext cx="14562302" cy="6083642"/>
+              <a:off x="935037" y="11150317"/>
+              <a:ext cx="14255926" cy="5381240"/>
             </a:xfrm>
             <a:prstGeom prst="rect">
               <a:avLst/>
@@ -4576,7 +4603,7 @@
         </p:pic>
         <p:pic>
           <p:nvPicPr>
-            <p:cNvPr id="37" name="Picture 36" descr="A picture containing text, map&#10;&#10;Description automatically generated">
+            <p:cNvPr id="37" name="Picture 36">
               <a:extLst>
                 <a:ext uri="{FF2B5EF4-FFF2-40B4-BE49-F238E27FC236}">
                   <a16:creationId xmlns:a16="http://schemas.microsoft.com/office/drawing/2014/main" id="{D38DCDC5-7A10-4C3F-A848-19B2023A6320}"/>
@@ -4589,20 +4616,20 @@
             <p:nvPr/>
           </p:nvPicPr>
           <p:blipFill rotWithShape="1">
-            <a:blip r:embed="rId7">
+            <a:blip r:embed="rId8">
               <a:extLst>
                 <a:ext uri="{28A0092B-C50C-407E-A947-70E740481C1C}">
                   <a14:useLocalDpi xmlns:a14="http://schemas.microsoft.com/office/drawing/2010/main" val="0"/>
                 </a:ext>
               </a:extLst>
             </a:blip>
-            <a:srcRect l="129" t="55415" r="-129" b="-7294"/>
+            <a:srcRect b="9884"/>
             <a:stretch/>
           </p:blipFill>
           <p:spPr>
             <a:xfrm>
-              <a:off x="15269891" y="11095429"/>
-              <a:ext cx="14562302" cy="6083642"/>
+              <a:off x="15654571" y="10904929"/>
+              <a:ext cx="14255926" cy="5666412"/>
             </a:xfrm>
             <a:prstGeom prst="rect">
               <a:avLst/>
@@ -4623,8 +4650,8 @@
           </p:nvSpPr>
           <p:spPr>
             <a:xfrm>
-              <a:off x="4176117" y="10233780"/>
-              <a:ext cx="7259782" cy="1200329"/>
+              <a:off x="3805201" y="10096872"/>
+              <a:ext cx="7813642" cy="1200329"/>
             </a:xfrm>
             <a:prstGeom prst="rect">
               <a:avLst/>
@@ -4646,7 +4673,7 @@
                   <a:latin typeface="Arial" panose="020B0604020202020204" pitchFamily="34" charset="0"/>
                   <a:cs typeface="Arial" panose="020B0604020202020204" pitchFamily="34" charset="0"/>
                 </a:rPr>
-                <a:t>EL NIÑO</a:t>
+                <a:t>idealized El Niño</a:t>
               </a:r>
             </a:p>
           </p:txBody>
@@ -4665,8 +4692,8 @@
           </p:nvSpPr>
           <p:spPr>
             <a:xfrm>
-              <a:off x="19300032" y="10233780"/>
-              <a:ext cx="7259782" cy="1200329"/>
+              <a:off x="18851328" y="10096872"/>
+              <a:ext cx="7651433" cy="1200329"/>
             </a:xfrm>
             <a:prstGeom prst="rect">
               <a:avLst/>
@@ -4688,7 +4715,7 @@
                   <a:latin typeface="Arial" panose="020B0604020202020204" pitchFamily="34" charset="0"/>
                   <a:cs typeface="Arial" panose="020B0604020202020204" pitchFamily="34" charset="0"/>
                 </a:rPr>
-                <a:t>LA NIÑA</a:t>
+                <a:t>idealized La Niña</a:t>
               </a:r>
             </a:p>
           </p:txBody>
@@ -4708,8 +4735,8 @@
         </p:nvSpPr>
         <p:spPr>
           <a:xfrm>
-            <a:off x="15450217" y="37897668"/>
-            <a:ext cx="14040983" cy="1569660"/>
+            <a:off x="15446543" y="40695345"/>
+            <a:ext cx="13847130" cy="1569660"/>
           </a:xfrm>
           <a:prstGeom prst="rect">
             <a:avLst/>
@@ -4963,9 +4990,9 @@
           </a:p>
         </p:txBody>
       </p:sp>
-      <mc:AlternateContent xmlns:mc="http://schemas.openxmlformats.org/markup-compatibility/2006">
-        <mc:Choice xmlns:p14="http://schemas.microsoft.com/office/powerpoint/2010/main" Requires="p14">
-          <p:contentPart p14:bwMode="auto" r:id="rId8">
+      <mc:AlternateContent xmlns:mc="http://schemas.openxmlformats.org/markup-compatibility/2006" xmlns:p14="http://schemas.microsoft.com/office/powerpoint/2010/main">
+        <mc:Choice Requires="p14">
+          <p:contentPart p14:bwMode="auto" r:id="rId9">
             <p14:nvContentPartPr>
               <p14:cNvPr id="3" name="Ink 2">
                 <a:extLst>
@@ -4983,7 +5010,7 @@
             </p14:xfrm>
           </p:contentPart>
         </mc:Choice>
-        <mc:Fallback>
+        <mc:Fallback xmlns="">
           <p:pic>
             <p:nvPicPr>
               <p:cNvPr id="3" name="Ink 2">
@@ -4997,7 +5024,7 @@
               <p:nvPr/>
             </p:nvPicPr>
             <p:blipFill>
-              <a:blip r:embed="rId9"/>
+              <a:blip r:embed="rId10"/>
               <a:stretch>
                 <a:fillRect/>
               </a:stretch>
@@ -5014,168 +5041,6 @@
           </p:pic>
         </mc:Fallback>
       </mc:AlternateContent>
-      <mc:AlternateContent xmlns:mc="http://schemas.openxmlformats.org/markup-compatibility/2006">
-        <mc:Choice xmlns:p14="http://schemas.microsoft.com/office/powerpoint/2010/main" Requires="p14">
-          <p:contentPart p14:bwMode="auto" r:id="rId10">
-            <p14:nvContentPartPr>
-              <p14:cNvPr id="10" name="Ink 9">
-                <a:extLst>
-                  <a:ext uri="{FF2B5EF4-FFF2-40B4-BE49-F238E27FC236}">
-                    <a16:creationId xmlns:a16="http://schemas.microsoft.com/office/drawing/2014/main" id="{2A338DF8-1472-46CB-ADF2-BB92C7B43EF5}"/>
-                  </a:ext>
-                </a:extLst>
-              </p14:cNvPr>
-              <p14:cNvContentPartPr/>
-              <p14:nvPr/>
-            </p14:nvContentPartPr>
-            <p14:xfrm>
-              <a:off x="-8273820" y="32463600"/>
-              <a:ext cx="503280" cy="253440"/>
-            </p14:xfrm>
-          </p:contentPart>
-        </mc:Choice>
-        <mc:Fallback>
-          <p:pic>
-            <p:nvPicPr>
-              <p:cNvPr id="10" name="Ink 9">
-                <a:extLst>
-                  <a:ext uri="{FF2B5EF4-FFF2-40B4-BE49-F238E27FC236}">
-                    <a16:creationId xmlns:a16="http://schemas.microsoft.com/office/drawing/2014/main" id="{2A338DF8-1472-46CB-ADF2-BB92C7B43EF5}"/>
-                  </a:ext>
-                </a:extLst>
-              </p:cNvPr>
-              <p:cNvPicPr/>
-              <p:nvPr/>
-            </p:nvPicPr>
-            <p:blipFill>
-              <a:blip r:embed="rId11"/>
-              <a:stretch>
-                <a:fillRect/>
-              </a:stretch>
-            </p:blipFill>
-            <p:spPr>
-              <a:xfrm>
-                <a:off x="-8282460" y="32454600"/>
-                <a:ext cx="520920" cy="271080"/>
-              </a:xfrm>
-              <a:prstGeom prst="rect">
-                <a:avLst/>
-              </a:prstGeom>
-            </p:spPr>
-          </p:pic>
-        </mc:Fallback>
-      </mc:AlternateContent>
-      <p:pic>
-        <p:nvPicPr>
-          <p:cNvPr id="24" name="Picture 23">
-            <a:extLst>
-              <a:ext uri="{FF2B5EF4-FFF2-40B4-BE49-F238E27FC236}">
-                <a16:creationId xmlns:a16="http://schemas.microsoft.com/office/drawing/2014/main" id="{ACE3FB3A-AE93-490B-B47E-62AEF7B9C2D1}"/>
-              </a:ext>
-            </a:extLst>
-          </p:cNvPr>
-          <p:cNvPicPr>
-            <a:picLocks noChangeAspect="1"/>
-          </p:cNvPicPr>
-          <p:nvPr/>
-        </p:nvPicPr>
-        <p:blipFill rotWithShape="1">
-          <a:blip r:embed="rId12">
-            <a:extLst>
-              <a:ext uri="{28A0092B-C50C-407E-A947-70E740481C1C}">
-                <a14:useLocalDpi xmlns:a14="http://schemas.microsoft.com/office/drawing/2010/main" val="0"/>
-              </a:ext>
-            </a:extLst>
-          </a:blip>
-          <a:srcRect/>
-          <a:stretch/>
-        </p:blipFill>
-        <p:spPr>
-          <a:xfrm>
-            <a:off x="377488" y="17602859"/>
-            <a:ext cx="29124753" cy="11055207"/>
-          </a:xfrm>
-          <a:prstGeom prst="rect">
-            <a:avLst/>
-          </a:prstGeom>
-        </p:spPr>
-      </p:pic>
-      <p:sp>
-        <p:nvSpPr>
-          <p:cNvPr id="45" name="TextBox 44">
-            <a:extLst>
-              <a:ext uri="{FF2B5EF4-FFF2-40B4-BE49-F238E27FC236}">
-                <a16:creationId xmlns:a16="http://schemas.microsoft.com/office/drawing/2014/main" id="{4B3C0EDF-69C3-4398-8A58-83C07D766827}"/>
-              </a:ext>
-            </a:extLst>
-          </p:cNvPr>
-          <p:cNvSpPr txBox="1"/>
-          <p:nvPr/>
-        </p:nvSpPr>
-        <p:spPr>
-          <a:xfrm>
-            <a:off x="285659" y="16830160"/>
-            <a:ext cx="17545914" cy="830997"/>
-          </a:xfrm>
-          <a:prstGeom prst="rect">
-            <a:avLst/>
-          </a:prstGeom>
-          <a:noFill/>
-        </p:spPr>
-        <p:txBody>
-          <a:bodyPr wrap="square" rtlCol="0">
-            <a:spAutoFit/>
-          </a:bodyPr>
-          <a:lstStyle/>
-          <a:p>
-            <a:r>
-              <a:rPr lang="en-GB" sz="4800" dirty="0">
-                <a:latin typeface="Arial" panose="020B0604020202020204" pitchFamily="34" charset="0"/>
-                <a:cs typeface="Arial" panose="020B0604020202020204" pitchFamily="34" charset="0"/>
-              </a:rPr>
-              <a:t>a) adiabatic fluxes changing WWV</a:t>
-            </a:r>
-          </a:p>
-        </p:txBody>
-      </p:sp>
-      <p:sp>
-        <p:nvSpPr>
-          <p:cNvPr id="46" name="TextBox 45">
-            <a:extLst>
-              <a:ext uri="{FF2B5EF4-FFF2-40B4-BE49-F238E27FC236}">
-                <a16:creationId xmlns:a16="http://schemas.microsoft.com/office/drawing/2014/main" id="{B1871DF4-318D-4048-BB5D-FBFFBF70F4C2}"/>
-              </a:ext>
-            </a:extLst>
-          </p:cNvPr>
-          <p:cNvSpPr txBox="1"/>
-          <p:nvPr/>
-        </p:nvSpPr>
-        <p:spPr>
-          <a:xfrm>
-            <a:off x="285659" y="22274393"/>
-            <a:ext cx="17545914" cy="830997"/>
-          </a:xfrm>
-          <a:prstGeom prst="rect">
-            <a:avLst/>
-          </a:prstGeom>
-          <a:noFill/>
-        </p:spPr>
-        <p:txBody>
-          <a:bodyPr wrap="square" rtlCol="0">
-            <a:spAutoFit/>
-          </a:bodyPr>
-          <a:lstStyle/>
-          <a:p>
-            <a:r>
-              <a:rPr lang="en-GB" sz="4800" dirty="0">
-                <a:latin typeface="Arial" panose="020B0604020202020204" pitchFamily="34" charset="0"/>
-                <a:cs typeface="Arial" panose="020B0604020202020204" pitchFamily="34" charset="0"/>
-              </a:rPr>
-              <a:t>b) diabatic fluxes changing WWV</a:t>
-            </a:r>
-          </a:p>
-        </p:txBody>
-      </p:sp>
       <p:sp>
         <p:nvSpPr>
           <p:cNvPr id="28" name="Rectangle 27">
@@ -5190,8 +5055,8 @@
         </p:nvSpPr>
         <p:spPr>
           <a:xfrm>
-            <a:off x="377488" y="39324349"/>
-            <a:ext cx="29202218" cy="3046988"/>
+            <a:off x="182080" y="6525005"/>
+            <a:ext cx="30084643" cy="3046988"/>
           </a:xfrm>
           <a:prstGeom prst="rect">
             <a:avLst/>
@@ -5203,12 +5068,16 @@
           </a:bodyPr>
           <a:lstStyle/>
           <a:p>
+            <a:pPr marL="685800" indent="-685800">
+              <a:buFont typeface="Arial" panose="020B0604020202020204" pitchFamily="34" charset="0"/>
+              <a:buChar char="•"/>
+            </a:pPr>
             <a:r>
               <a:rPr lang="en-GB" sz="4800" dirty="0">
                 <a:latin typeface="Arial" panose="020B0604020202020204" pitchFamily="34" charset="0"/>
                 <a:cs typeface="Arial" panose="020B0604020202020204" pitchFamily="34" charset="0"/>
               </a:rPr>
-              <a:t>Method: </a:t>
+              <a:t>Warm Water Volume (WWV, i.e. the volume of water above 20°C in the Pacific) is a key inclusion in ENSO forecasting. Many factors influencing it remain a mystery.</a:t>
             </a:r>
           </a:p>
           <a:p>
@@ -5221,27 +5090,14 @@
                 <a:latin typeface="Arial" panose="020B0604020202020204" pitchFamily="34" charset="0"/>
                 <a:cs typeface="Arial" panose="020B0604020202020204" pitchFamily="34" charset="0"/>
               </a:rPr>
-              <a:t>simulating ENSO events in MOM5 / ACCESS-OM2, ¼° global ocean, sea ice models with 50 vertical depth levels and CORE-NYF + ERA-Interim / JRA55 forcing</a:t>
-            </a:r>
-          </a:p>
-          <a:p>
-            <a:pPr marL="685800" indent="-685800">
-              <a:buFont typeface="Arial" panose="020B0604020202020204" pitchFamily="34" charset="0"/>
-              <a:buChar char="•"/>
-            </a:pPr>
-            <a:r>
-              <a:rPr lang="en-GB" sz="4800" dirty="0">
-                <a:latin typeface="Arial" panose="020B0604020202020204" pitchFamily="34" charset="0"/>
-                <a:cs typeface="Arial" panose="020B0604020202020204" pitchFamily="34" charset="0"/>
-              </a:rPr>
-              <a:t>using the Water Mass Transformation framework to analyse the WWV balance terms</a:t>
+              <a:t>Here, we simulate ENSO events in MOM5 / ACCESS-OM2, two ¼° global ocean, sea ice models with CORE-NYF + ERA-Interim / JRA55 forcing and use the Water Mass Transformation framework for analysis.</a:t>
             </a:r>
           </a:p>
         </p:txBody>
       </p:sp>
       <p:pic>
         <p:nvPicPr>
-          <p:cNvPr id="30" name="Picture 29" descr="A close up of a map&#10;&#10;Description automatically generated">
+          <p:cNvPr id="30" name="Picture 29">
             <a:extLst>
               <a:ext uri="{FF2B5EF4-FFF2-40B4-BE49-F238E27FC236}">
                 <a16:creationId xmlns:a16="http://schemas.microsoft.com/office/drawing/2014/main" id="{57A6BAB8-7085-409C-A9B3-2CFD332B7162}"/>
@@ -5254,20 +5110,20 @@
           <p:nvPr/>
         </p:nvPicPr>
         <p:blipFill rotWithShape="1">
-          <a:blip r:embed="rId13" cstate="print">
+          <a:blip r:embed="rId11">
             <a:extLst>
               <a:ext uri="{28A0092B-C50C-407E-A947-70E740481C1C}">
                 <a14:useLocalDpi xmlns:a14="http://schemas.microsoft.com/office/drawing/2010/main" val="0"/>
               </a:ext>
             </a:extLst>
           </a:blip>
-          <a:srcRect l="4667" r="8628"/>
+          <a:srcRect/>
           <a:stretch/>
         </p:blipFill>
         <p:spPr>
           <a:xfrm>
-            <a:off x="15984516" y="30382533"/>
-            <a:ext cx="12972383" cy="7482114"/>
+            <a:off x="15446543" y="32652001"/>
+            <a:ext cx="13653273" cy="8054078"/>
           </a:xfrm>
           <a:prstGeom prst="rect">
             <a:avLst/>
@@ -5288,7 +5144,7 @@
         </p:nvSpPr>
         <p:spPr>
           <a:xfrm>
-            <a:off x="285659" y="27887419"/>
+            <a:off x="320249" y="30209280"/>
             <a:ext cx="29316696" cy="1569660"/>
           </a:xfrm>
           <a:prstGeom prst="rect">
@@ -5316,17 +5172,52 @@
                 <a:latin typeface="Arial" panose="020B0604020202020204" pitchFamily="34" charset="0"/>
                 <a:cs typeface="Arial" panose="020B0604020202020204" pitchFamily="34" charset="0"/>
               </a:rPr>
-              <a:t>Time series of the (a) adiabatic and (b) diabatic WWV budget terms during a simulation with the ACCESS-OM2 model.</a:t>
-            </a:r>
-          </a:p>
-        </p:txBody>
-      </p:sp>
-      <p:sp>
-        <p:nvSpPr>
-          <p:cNvPr id="54" name="TextBox 53">
+              <a:t>Time series of the (a) adiabatic and (b) diabatic WWV budget terms during a simulation with the ACCESS-OM2 model. The N34 index in (b) is multiplied by a factor of ten.</a:t>
+            </a:r>
+          </a:p>
+        </p:txBody>
+      </p:sp>
+      <p:pic>
+        <p:nvPicPr>
+          <p:cNvPr id="5" name="Picture 4" descr="A close up of a map&#10;&#10;Description automatically generated">
             <a:extLst>
               <a:ext uri="{FF2B5EF4-FFF2-40B4-BE49-F238E27FC236}">
-                <a16:creationId xmlns:a16="http://schemas.microsoft.com/office/drawing/2014/main" id="{3D2B7A9E-B622-4E6B-854B-646AE0C7EF52}"/>
+                <a16:creationId xmlns:a16="http://schemas.microsoft.com/office/drawing/2014/main" id="{0596C614-10B6-4471-B9EB-A5E46A4BB41A}"/>
+              </a:ext>
+            </a:extLst>
+          </p:cNvPr>
+          <p:cNvPicPr>
+            <a:picLocks noChangeAspect="1"/>
+          </p:cNvPicPr>
+          <p:nvPr/>
+        </p:nvPicPr>
+        <p:blipFill rotWithShape="1">
+          <a:blip r:embed="rId12" cstate="print">
+            <a:extLst>
+              <a:ext uri="{28A0092B-C50C-407E-A947-70E740481C1C}">
+                <a14:useLocalDpi xmlns:a14="http://schemas.microsoft.com/office/drawing/2010/main" val="0"/>
+              </a:ext>
+            </a:extLst>
+          </a:blip>
+          <a:srcRect b="5019"/>
+          <a:stretch/>
+        </p:blipFill>
+        <p:spPr>
+          <a:xfrm>
+            <a:off x="704781" y="20006795"/>
+            <a:ext cx="28252118" cy="10153427"/>
+          </a:xfrm>
+          <a:prstGeom prst="rect">
+            <a:avLst/>
+          </a:prstGeom>
+        </p:spPr>
+      </p:pic>
+      <p:sp>
+        <p:nvSpPr>
+          <p:cNvPr id="45" name="TextBox 44">
+            <a:extLst>
+              <a:ext uri="{FF2B5EF4-FFF2-40B4-BE49-F238E27FC236}">
+                <a16:creationId xmlns:a16="http://schemas.microsoft.com/office/drawing/2014/main" id="{4B3C0EDF-69C3-4398-8A58-83C07D766827}"/>
               </a:ext>
             </a:extLst>
           </p:cNvPr>
@@ -5335,15 +5226,13 @@
         </p:nvSpPr>
         <p:spPr>
           <a:xfrm>
-            <a:off x="285659" y="7870722"/>
-            <a:ext cx="5993358" cy="830997"/>
+            <a:off x="285659" y="19175798"/>
+            <a:ext cx="17545914" cy="830997"/>
           </a:xfrm>
           <a:prstGeom prst="rect">
             <a:avLst/>
           </a:prstGeom>
-          <a:solidFill>
-            <a:schemeClr val="bg1"/>
-          </a:solidFill>
+          <a:noFill/>
         </p:spPr>
         <p:txBody>
           <a:bodyPr wrap="square" rtlCol="0">
@@ -5356,17 +5245,17 @@
                 <a:latin typeface="Arial" panose="020B0604020202020204" pitchFamily="34" charset="0"/>
                 <a:cs typeface="Arial" panose="020B0604020202020204" pitchFamily="34" charset="0"/>
               </a:rPr>
-              <a:t>a) El Niño discharge</a:t>
-            </a:r>
-          </a:p>
-        </p:txBody>
-      </p:sp>
-      <p:sp>
-        <p:nvSpPr>
-          <p:cNvPr id="55" name="TextBox 54">
+              <a:t>a) adiabatic fluxes changing WWV</a:t>
+            </a:r>
+          </a:p>
+        </p:txBody>
+      </p:sp>
+      <p:sp>
+        <p:nvSpPr>
+          <p:cNvPr id="46" name="TextBox 45">
             <a:extLst>
               <a:ext uri="{FF2B5EF4-FFF2-40B4-BE49-F238E27FC236}">
-                <a16:creationId xmlns:a16="http://schemas.microsoft.com/office/drawing/2014/main" id="{8CAA5E8A-1565-4AEC-B247-5D4314BB0975}"/>
+                <a16:creationId xmlns:a16="http://schemas.microsoft.com/office/drawing/2014/main" id="{B1871DF4-318D-4048-BB5D-FBFFBF70F4C2}"/>
               </a:ext>
             </a:extLst>
           </p:cNvPr>
@@ -5375,15 +5264,13 @@
         </p:nvSpPr>
         <p:spPr>
           <a:xfrm>
-            <a:off x="15146098" y="7761674"/>
-            <a:ext cx="5843768" cy="830997"/>
+            <a:off x="285659" y="24307212"/>
+            <a:ext cx="17545914" cy="830997"/>
           </a:xfrm>
           <a:prstGeom prst="rect">
             <a:avLst/>
           </a:prstGeom>
-          <a:solidFill>
-            <a:schemeClr val="bg1"/>
-          </a:solidFill>
+          <a:noFill/>
         </p:spPr>
         <p:txBody>
           <a:bodyPr wrap="square" rtlCol="0">
@@ -5396,11 +5283,260 @@
                 <a:latin typeface="Arial" panose="020B0604020202020204" pitchFamily="34" charset="0"/>
                 <a:cs typeface="Arial" panose="020B0604020202020204" pitchFamily="34" charset="0"/>
               </a:rPr>
-              <a:t>b) La Niña recharge</a:t>
-            </a:r>
-          </a:p>
-        </p:txBody>
-      </p:sp>
+              <a:t>b) diabatic fluxes changing WWV</a:t>
+            </a:r>
+          </a:p>
+        </p:txBody>
+      </p:sp>
+      <mc:AlternateContent xmlns:mc="http://schemas.openxmlformats.org/markup-compatibility/2006" xmlns:p14="http://schemas.microsoft.com/office/powerpoint/2010/main">
+        <mc:Choice Requires="p14">
+          <p:contentPart p14:bwMode="auto" r:id="rId13">
+            <p14:nvContentPartPr>
+              <p14:cNvPr id="12" name="Ink 11">
+                <a:extLst>
+                  <a:ext uri="{FF2B5EF4-FFF2-40B4-BE49-F238E27FC236}">
+                    <a16:creationId xmlns:a16="http://schemas.microsoft.com/office/drawing/2014/main" id="{76B19A5F-1356-48A1-833C-B78199D48024}"/>
+                  </a:ext>
+                </a:extLst>
+              </p14:cNvPr>
+              <p14:cNvContentPartPr/>
+              <p14:nvPr/>
+            </p14:nvContentPartPr>
+            <p14:xfrm>
+              <a:off x="6951381" y="29748944"/>
+              <a:ext cx="360" cy="360"/>
+            </p14:xfrm>
+          </p:contentPart>
+        </mc:Choice>
+        <mc:Fallback xmlns="">
+          <p:pic>
+            <p:nvPicPr>
+              <p:cNvPr id="12" name="Ink 11">
+                <a:extLst>
+                  <a:ext uri="{FF2B5EF4-FFF2-40B4-BE49-F238E27FC236}">
+                    <a16:creationId xmlns:a16="http://schemas.microsoft.com/office/drawing/2014/main" id="{76B19A5F-1356-48A1-833C-B78199D48024}"/>
+                  </a:ext>
+                </a:extLst>
+              </p:cNvPr>
+              <p:cNvPicPr/>
+              <p:nvPr/>
+            </p:nvPicPr>
+            <p:blipFill>
+              <a:blip r:embed="rId14"/>
+              <a:stretch>
+                <a:fillRect/>
+              </a:stretch>
+            </p:blipFill>
+            <p:spPr>
+              <a:xfrm>
+                <a:off x="6942381" y="29740304"/>
+                <a:ext cx="18000" cy="18000"/>
+              </a:xfrm>
+              <a:prstGeom prst="rect">
+                <a:avLst/>
+              </a:prstGeom>
+            </p:spPr>
+          </p:pic>
+        </mc:Fallback>
+      </mc:AlternateContent>
+      <p:pic>
+        <p:nvPicPr>
+          <p:cNvPr id="22" name="Picture 21" descr="A drawing of a cartoon character&#10;&#10;Description automatically generated">
+            <a:extLst>
+              <a:ext uri="{FF2B5EF4-FFF2-40B4-BE49-F238E27FC236}">
+                <a16:creationId xmlns:a16="http://schemas.microsoft.com/office/drawing/2014/main" id="{69A147CD-4A29-497E-A058-C6AD2BFE7A9A}"/>
+              </a:ext>
+            </a:extLst>
+          </p:cNvPr>
+          <p:cNvPicPr>
+            <a:picLocks noChangeAspect="1"/>
+          </p:cNvPicPr>
+          <p:nvPr/>
+        </p:nvPicPr>
+        <p:blipFill rotWithShape="1">
+          <a:blip r:embed="rId15" cstate="print">
+            <a:extLst>
+              <a:ext uri="{28A0092B-C50C-407E-A947-70E740481C1C}">
+                <a14:useLocalDpi xmlns:a14="http://schemas.microsoft.com/office/drawing/2010/main" val="0"/>
+              </a:ext>
+            </a:extLst>
+          </a:blip>
+          <a:srcRect b="41486"/>
+          <a:stretch/>
+        </p:blipFill>
+        <p:spPr>
+          <a:xfrm>
+            <a:off x="28911046" y="42074398"/>
+            <a:ext cx="575617" cy="420469"/>
+          </a:xfrm>
+          <a:prstGeom prst="rect">
+            <a:avLst/>
+          </a:prstGeom>
+        </p:spPr>
+      </p:pic>
+      <p:pic>
+        <p:nvPicPr>
+          <p:cNvPr id="56" name="Picture 55">
+            <a:extLst>
+              <a:ext uri="{FF2B5EF4-FFF2-40B4-BE49-F238E27FC236}">
+                <a16:creationId xmlns:a16="http://schemas.microsoft.com/office/drawing/2014/main" id="{ECEFCEDA-F1B5-4F18-BEF7-5BD327E128F6}"/>
+              </a:ext>
+            </a:extLst>
+          </p:cNvPr>
+          <p:cNvPicPr>
+            <a:picLocks noChangeAspect="1"/>
+          </p:cNvPicPr>
+          <p:nvPr/>
+        </p:nvPicPr>
+        <p:blipFill rotWithShape="1">
+          <a:blip r:embed="rId7">
+            <a:extLst>
+              <a:ext uri="{28A0092B-C50C-407E-A947-70E740481C1C}">
+                <a14:useLocalDpi xmlns:a14="http://schemas.microsoft.com/office/drawing/2010/main" val="0"/>
+              </a:ext>
+            </a:extLst>
+          </a:blip>
+          <a:srcRect l="71521" b="89588"/>
+          <a:stretch/>
+        </p:blipFill>
+        <p:spPr>
+          <a:xfrm>
+            <a:off x="11853956" y="10422820"/>
+            <a:ext cx="4059866" cy="654706"/>
+          </a:xfrm>
+          <a:prstGeom prst="rect">
+            <a:avLst/>
+          </a:prstGeom>
+        </p:spPr>
+      </p:pic>
+      <p:sp>
+        <p:nvSpPr>
+          <p:cNvPr id="59" name="TextBox 58">
+            <a:extLst>
+              <a:ext uri="{FF2B5EF4-FFF2-40B4-BE49-F238E27FC236}">
+                <a16:creationId xmlns:a16="http://schemas.microsoft.com/office/drawing/2014/main" id="{326C662C-BB50-4751-9C1B-112A14A78CD8}"/>
+              </a:ext>
+            </a:extLst>
+          </p:cNvPr>
+          <p:cNvSpPr txBox="1"/>
+          <p:nvPr/>
+        </p:nvSpPr>
+        <p:spPr>
+          <a:xfrm>
+            <a:off x="5686587" y="18132835"/>
+            <a:ext cx="19128239" cy="1200329"/>
+          </a:xfrm>
+          <a:prstGeom prst="rect">
+            <a:avLst/>
+          </a:prstGeom>
+          <a:noFill/>
+        </p:spPr>
+        <p:txBody>
+          <a:bodyPr wrap="square" rtlCol="0">
+            <a:spAutoFit/>
+          </a:bodyPr>
+          <a:lstStyle/>
+          <a:p>
+            <a:pPr algn="ctr"/>
+            <a:r>
+              <a:rPr lang="en-GB" sz="7200" dirty="0">
+                <a:latin typeface="Arial" panose="020B0604020202020204" pitchFamily="34" charset="0"/>
+                <a:cs typeface="Arial" panose="020B0604020202020204" pitchFamily="34" charset="0"/>
+              </a:rPr>
+              <a:t>ENSO variability for 1979-2016</a:t>
+            </a:r>
+          </a:p>
+        </p:txBody>
+      </p:sp>
+      <p:sp>
+        <p:nvSpPr>
+          <p:cNvPr id="67" name="Rectangle 66">
+            <a:extLst>
+              <a:ext uri="{FF2B5EF4-FFF2-40B4-BE49-F238E27FC236}">
+                <a16:creationId xmlns:a16="http://schemas.microsoft.com/office/drawing/2014/main" id="{BB17831E-93F6-42D4-9158-491D24A51BDB}"/>
+              </a:ext>
+            </a:extLst>
+          </p:cNvPr>
+          <p:cNvSpPr/>
+          <p:nvPr/>
+        </p:nvSpPr>
+        <p:spPr>
+          <a:xfrm>
+            <a:off x="15072289" y="5103457"/>
+            <a:ext cx="2040943" cy="523220"/>
+          </a:xfrm>
+          <a:prstGeom prst="rect">
+            <a:avLst/>
+          </a:prstGeom>
+        </p:spPr>
+        <p:txBody>
+          <a:bodyPr wrap="none">
+            <a:spAutoFit/>
+          </a:bodyPr>
+          <a:lstStyle/>
+          <a:p>
+            <a:r>
+              <a:rPr lang="en-GB" sz="2800" dirty="0">
+                <a:latin typeface="Arial" panose="020B0604020202020204" pitchFamily="34" charset="0"/>
+                <a:cs typeface="Arial" panose="020B0604020202020204" pitchFamily="34" charset="0"/>
+              </a:rPr>
+              <a:t>link to .PDF</a:t>
+            </a:r>
+            <a:endParaRPr lang="en-GB" sz="2800" dirty="0"/>
+          </a:p>
+        </p:txBody>
+      </p:sp>
+      <mc:AlternateContent xmlns:mc="http://schemas.openxmlformats.org/markup-compatibility/2006">
+        <mc:Choice xmlns:p14="http://schemas.microsoft.com/office/powerpoint/2010/main" Requires="p14">
+          <p:contentPart p14:bwMode="auto" r:id="rId16">
+            <p14:nvContentPartPr>
+              <p14:cNvPr id="2" name="Ink 1">
+                <a:extLst>
+                  <a:ext uri="{FF2B5EF4-FFF2-40B4-BE49-F238E27FC236}">
+                    <a16:creationId xmlns:a16="http://schemas.microsoft.com/office/drawing/2014/main" id="{BDA732D3-E3BA-4A49-B332-BD1D31EE7D6D}"/>
+                  </a:ext>
+                </a:extLst>
+              </p14:cNvPr>
+              <p14:cNvContentPartPr/>
+              <p14:nvPr/>
+            </p14:nvContentPartPr>
+            <p14:xfrm>
+              <a:off x="20650320" y="10112133"/>
+              <a:ext cx="114120" cy="19800"/>
+            </p14:xfrm>
+          </p:contentPart>
+        </mc:Choice>
+        <mc:Fallback>
+          <p:pic>
+            <p:nvPicPr>
+              <p:cNvPr id="2" name="Ink 1">
+                <a:extLst>
+                  <a:ext uri="{FF2B5EF4-FFF2-40B4-BE49-F238E27FC236}">
+                    <a16:creationId xmlns:a16="http://schemas.microsoft.com/office/drawing/2014/main" id="{BDA732D3-E3BA-4A49-B332-BD1D31EE7D6D}"/>
+                  </a:ext>
+                </a:extLst>
+              </p:cNvPr>
+              <p:cNvPicPr/>
+              <p:nvPr/>
+            </p:nvPicPr>
+            <p:blipFill>
+              <a:blip r:embed="rId17"/>
+              <a:stretch>
+                <a:fillRect/>
+              </a:stretch>
+            </p:blipFill>
+            <p:spPr>
+              <a:xfrm>
+                <a:off x="20641320" y="10103493"/>
+                <a:ext cx="131760" cy="37440"/>
+              </a:xfrm>
+              <a:prstGeom prst="rect">
+                <a:avLst/>
+              </a:prstGeom>
+            </p:spPr>
+          </p:pic>
+        </mc:Fallback>
+      </mc:AlternateContent>
     </p:spTree>
     <p:extLst>
       <p:ext uri="{BB962C8B-B14F-4D97-AF65-F5344CB8AC3E}">
@@ -6198,6 +6334,21 @@
 </file>
 
 <file path=customXml/item1.xml><?xml version="1.0" encoding="utf-8"?>
+<p:properties xmlns:p="http://schemas.microsoft.com/office/2006/metadata/properties" xmlns:xsi="http://www.w3.org/2001/XMLSchema-instance" xmlns:pc="http://schemas.microsoft.com/office/infopath/2007/PartnerControls">
+  <documentManagement/>
+</p:properties>
+</file>
+
+<file path=customXml/item2.xml><?xml version="1.0" encoding="utf-8"?>
+<?mso-contentType ?>
+<FormTemplates xmlns="http://schemas.microsoft.com/sharepoint/v3/contenttype/forms">
+  <Display>DocumentLibraryForm</Display>
+  <Edit>DocumentLibraryForm</Edit>
+  <New>DocumentLibraryForm</New>
+</FormTemplates>
+</file>
+
+<file path=customXml/item3.xml><?xml version="1.0" encoding="utf-8"?>
 <ct:contentTypeSchema xmlns:ct="http://schemas.microsoft.com/office/2006/metadata/contentType" xmlns:ma="http://schemas.microsoft.com/office/2006/metadata/properties/metaAttributes" ct:_="" ma:_="" ma:contentTypeName="Document" ma:contentTypeID="0x01010055EF6BBE312FEB4D82AAE6E17BDA5126" ma:contentTypeVersion="6" ma:contentTypeDescription="Create a new document." ma:contentTypeScope="" ma:versionID="1c9ff379a8556a6d726efb775621987a">
   <xsd:schema xmlns:xsd="http://www.w3.org/2001/XMLSchema" xmlns:xs="http://www.w3.org/2001/XMLSchema" xmlns:p="http://schemas.microsoft.com/office/2006/metadata/properties" xmlns:ns3="55b9330c-b65e-4278-87f6-c99b13caa9a6" targetNamespace="http://schemas.microsoft.com/office/2006/metadata/properties" ma:root="true" ma:fieldsID="b8a364a476f1d9203dc5bd6398e56b59" ns3:_="">
     <xsd:import namespace="55b9330c-b65e-4278-87f6-c99b13caa9a6"/>
@@ -6355,22 +6506,31 @@
 </ct:contentTypeSchema>
 </file>
 
-<file path=customXml/item2.xml><?xml version="1.0" encoding="utf-8"?>
-<?mso-contentType ?>
-<FormTemplates xmlns="http://schemas.microsoft.com/sharepoint/v3/contenttype/forms">
-  <Display>DocumentLibraryForm</Display>
-  <Edit>DocumentLibraryForm</Edit>
-  <New>DocumentLibraryForm</New>
-</FormTemplates>
+<file path=customXml/itemProps1.xml><?xml version="1.0" encoding="utf-8"?>
+<ds:datastoreItem xmlns:ds="http://schemas.openxmlformats.org/officeDocument/2006/customXml" ds:itemID="{726E48BB-F264-4B8D-AFB3-ED7A7FB3EA56}">
+  <ds:schemaRefs>
+    <ds:schemaRef ds:uri="http://purl.org/dc/elements/1.1/"/>
+    <ds:schemaRef ds:uri="http://schemas.openxmlformats.org/package/2006/metadata/core-properties"/>
+    <ds:schemaRef ds:uri="55b9330c-b65e-4278-87f6-c99b13caa9a6"/>
+    <ds:schemaRef ds:uri="http://schemas.microsoft.com/office/infopath/2007/PartnerControls"/>
+    <ds:schemaRef ds:uri="http://schemas.microsoft.com/office/2006/documentManagement/types"/>
+    <ds:schemaRef ds:uri="http://www.w3.org/XML/1998/namespace"/>
+    <ds:schemaRef ds:uri="http://purl.org/dc/dcmitype/"/>
+    <ds:schemaRef ds:uri="http://purl.org/dc/terms/"/>
+    <ds:schemaRef ds:uri="http://schemas.microsoft.com/office/2006/metadata/properties"/>
+  </ds:schemaRefs>
+</ds:datastoreItem>
 </file>
 
-<file path=customXml/item3.xml><?xml version="1.0" encoding="utf-8"?>
-<p:properties xmlns:p="http://schemas.microsoft.com/office/2006/metadata/properties" xmlns:xsi="http://www.w3.org/2001/XMLSchema-instance" xmlns:pc="http://schemas.microsoft.com/office/infopath/2007/PartnerControls">
-  <documentManagement/>
-</p:properties>
+<file path=customXml/itemProps2.xml><?xml version="1.0" encoding="utf-8"?>
+<ds:datastoreItem xmlns:ds="http://schemas.openxmlformats.org/officeDocument/2006/customXml" ds:itemID="{E5A3562A-7909-4CE7-AB00-E98362C1F4FB}">
+  <ds:schemaRefs>
+    <ds:schemaRef ds:uri="http://schemas.microsoft.com/sharepoint/v3/contenttype/forms"/>
+  </ds:schemaRefs>
+</ds:datastoreItem>
 </file>
 
-<file path=customXml/itemProps1.xml><?xml version="1.0" encoding="utf-8"?>
+<file path=customXml/itemProps3.xml><?xml version="1.0" encoding="utf-8"?>
 <ds:datastoreItem xmlns:ds="http://schemas.openxmlformats.org/officeDocument/2006/customXml" ds:itemID="{AD33B81E-0435-4EEA-BA2F-61D5E68D7B6F}">
   <ds:schemaRefs>
     <ds:schemaRef ds:uri="http://schemas.microsoft.com/office/2006/metadata/contentType"/>
@@ -6386,28 +6546,4 @@
     <ds:schemaRef ds:uri="http://schemas.microsoft.com/internal/obd"/>
   </ds:schemaRefs>
 </ds:datastoreItem>
-</file>
-
-<file path=customXml/itemProps2.xml><?xml version="1.0" encoding="utf-8"?>
-<ds:datastoreItem xmlns:ds="http://schemas.openxmlformats.org/officeDocument/2006/customXml" ds:itemID="{E5A3562A-7909-4CE7-AB00-E98362C1F4FB}">
-  <ds:schemaRefs>
-    <ds:schemaRef ds:uri="http://schemas.microsoft.com/sharepoint/v3/contenttype/forms"/>
-  </ds:schemaRefs>
-</ds:datastoreItem>
-</file>
-
-<file path=customXml/itemProps3.xml><?xml version="1.0" encoding="utf-8"?>
-<ds:datastoreItem xmlns:ds="http://schemas.openxmlformats.org/officeDocument/2006/customXml" ds:itemID="{726E48BB-F264-4B8D-AFB3-ED7A7FB3EA56}">
-  <ds:schemaRefs>
-    <ds:schemaRef ds:uri="http://www.w3.org/XML/1998/namespace"/>
-    <ds:schemaRef ds:uri="http://purl.org/dc/terms/"/>
-    <ds:schemaRef ds:uri="http://schemas.microsoft.com/office/infopath/2007/PartnerControls"/>
-    <ds:schemaRef ds:uri="55b9330c-b65e-4278-87f6-c99b13caa9a6"/>
-    <ds:schemaRef ds:uri="http://schemas.microsoft.com/office/2006/documentManagement/types"/>
-    <ds:schemaRef ds:uri="http://purl.org/dc/elements/1.1/"/>
-    <ds:schemaRef ds:uri="http://schemas.openxmlformats.org/package/2006/metadata/core-properties"/>
-    <ds:schemaRef ds:uri="http://schemas.microsoft.com/office/2006/metadata/properties"/>
-    <ds:schemaRef ds:uri="http://purl.org/dc/dcmitype/"/>
-  </ds:schemaRefs>
-</ds:datastoreItem>
 </file>
</xml_diff>

<commit_message>
updated oral presentations and newest version of clex workshop poster
</commit_message>
<xml_diff>
--- a/presentations/poster_clex_workshop_maurice_huguenin_2019.pptx
+++ b/presentations/poster_clex_workshop_maurice_huguenin_2019.pptx
@@ -5122,8 +5122,8 @@
         </p:blipFill>
         <p:spPr>
           <a:xfrm>
-            <a:off x="15446543" y="32652001"/>
-            <a:ext cx="13653273" cy="8054078"/>
+            <a:off x="15533527" y="32652001"/>
+            <a:ext cx="13479305" cy="8054078"/>
           </a:xfrm>
           <a:prstGeom prst="rect">
             <a:avLst/>
@@ -5366,7 +5366,7 @@
         </p:blipFill>
         <p:spPr>
           <a:xfrm>
-            <a:off x="28911046" y="42074398"/>
+            <a:off x="28911046" y="42055348"/>
             <a:ext cx="575617" cy="420469"/>
           </a:xfrm>
           <a:prstGeom prst="rect">
@@ -5486,8 +5486,8 @@
           </a:p>
         </p:txBody>
       </p:sp>
-      <mc:AlternateContent xmlns:mc="http://schemas.openxmlformats.org/markup-compatibility/2006">
-        <mc:Choice xmlns:p14="http://schemas.microsoft.com/office/powerpoint/2010/main" Requires="p14">
+      <mc:AlternateContent xmlns:mc="http://schemas.openxmlformats.org/markup-compatibility/2006" xmlns:p14="http://schemas.microsoft.com/office/powerpoint/2010/main">
+        <mc:Choice Requires="p14">
           <p:contentPart p14:bwMode="auto" r:id="rId16">
             <p14:nvContentPartPr>
               <p14:cNvPr id="2" name="Ink 1">
@@ -5506,7 +5506,7 @@
             </p14:xfrm>
           </p:contentPart>
         </mc:Choice>
-        <mc:Fallback>
+        <mc:Fallback xmlns="">
           <p:pic>
             <p:nvPicPr>
               <p:cNvPr id="2" name="Ink 1">
@@ -6509,15 +6509,15 @@
 <file path=customXml/itemProps1.xml><?xml version="1.0" encoding="utf-8"?>
 <ds:datastoreItem xmlns:ds="http://schemas.openxmlformats.org/officeDocument/2006/customXml" ds:itemID="{726E48BB-F264-4B8D-AFB3-ED7A7FB3EA56}">
   <ds:schemaRefs>
+    <ds:schemaRef ds:uri="http://purl.org/dc/dcmitype/"/>
+    <ds:schemaRef ds:uri="http://schemas.openxmlformats.org/package/2006/metadata/core-properties"/>
+    <ds:schemaRef ds:uri="http://www.w3.org/XML/1998/namespace"/>
+    <ds:schemaRef ds:uri="http://schemas.microsoft.com/office/2006/documentManagement/types"/>
+    <ds:schemaRef ds:uri="55b9330c-b65e-4278-87f6-c99b13caa9a6"/>
+    <ds:schemaRef ds:uri="http://purl.org/dc/terms/"/>
+    <ds:schemaRef ds:uri="http://schemas.microsoft.com/office/infopath/2007/PartnerControls"/>
+    <ds:schemaRef ds:uri="http://schemas.microsoft.com/office/2006/metadata/properties"/>
     <ds:schemaRef ds:uri="http://purl.org/dc/elements/1.1/"/>
-    <ds:schemaRef ds:uri="http://schemas.openxmlformats.org/package/2006/metadata/core-properties"/>
-    <ds:schemaRef ds:uri="55b9330c-b65e-4278-87f6-c99b13caa9a6"/>
-    <ds:schemaRef ds:uri="http://schemas.microsoft.com/office/infopath/2007/PartnerControls"/>
-    <ds:schemaRef ds:uri="http://schemas.microsoft.com/office/2006/documentManagement/types"/>
-    <ds:schemaRef ds:uri="http://www.w3.org/XML/1998/namespace"/>
-    <ds:schemaRef ds:uri="http://purl.org/dc/dcmitype/"/>
-    <ds:schemaRef ds:uri="http://purl.org/dc/terms/"/>
-    <ds:schemaRef ds:uri="http://schemas.microsoft.com/office/2006/metadata/properties"/>
   </ds:schemaRefs>
 </ds:datastoreItem>
 </file>

</xml_diff>

<commit_message>
updated poster & corrected minor errors
</commit_message>
<xml_diff>
--- a/presentations/poster_clex_workshop_maurice_huguenin_2019.pptx
+++ b/presentations/poster_clex_workshop_maurice_huguenin_2019.pptx
@@ -211,7 +211,7 @@
           <a:p>
             <a:fld id="{D60A1517-57FD-4E08-9190-27AEEFFFA986}" type="datetimeFigureOut">
               <a:rPr lang="en-US" smtClean="0"/>
-              <a:t>11/14/2019</a:t>
+              <a:t>11/25/2019</a:t>
             </a:fld>
             <a:endParaRPr lang="en-US"/>
           </a:p>
@@ -457,7 +457,7 @@
           <a:p>
             <a:fld id="{FE88F1A9-1491-4A4B-9B77-13A01D10A0FF}" type="datetimeFigureOut">
               <a:rPr lang="en-US" smtClean="0"/>
-              <a:t>11/14/2019</a:t>
+              <a:t>11/25/2019</a:t>
             </a:fld>
             <a:endParaRPr lang="en-US"/>
           </a:p>
@@ -944,7 +944,7 @@
           <a:p>
             <a:fld id="{819FB65F-77A9-44EE-854A-5630BF17D415}" type="datetimeFigureOut">
               <a:rPr lang="en-US" smtClean="0"/>
-              <a:t>11/14/2019</a:t>
+              <a:t>11/25/2019</a:t>
             </a:fld>
             <a:endParaRPr lang="en-US"/>
           </a:p>
@@ -1114,7 +1114,7 @@
           <a:p>
             <a:fld id="{819FB65F-77A9-44EE-854A-5630BF17D415}" type="datetimeFigureOut">
               <a:rPr lang="en-US" smtClean="0"/>
-              <a:t>11/14/2019</a:t>
+              <a:t>11/25/2019</a:t>
             </a:fld>
             <a:endParaRPr lang="en-US"/>
           </a:p>
@@ -1294,7 +1294,7 @@
           <a:p>
             <a:fld id="{819FB65F-77A9-44EE-854A-5630BF17D415}" type="datetimeFigureOut">
               <a:rPr lang="en-US" smtClean="0"/>
-              <a:t>11/14/2019</a:t>
+              <a:t>11/25/2019</a:t>
             </a:fld>
             <a:endParaRPr lang="en-US"/>
           </a:p>
@@ -1464,7 +1464,7 @@
           <a:p>
             <a:fld id="{819FB65F-77A9-44EE-854A-5630BF17D415}" type="datetimeFigureOut">
               <a:rPr lang="en-US" smtClean="0"/>
-              <a:t>11/14/2019</a:t>
+              <a:t>11/25/2019</a:t>
             </a:fld>
             <a:endParaRPr lang="en-US"/>
           </a:p>
@@ -1708,7 +1708,7 @@
           <a:p>
             <a:fld id="{819FB65F-77A9-44EE-854A-5630BF17D415}" type="datetimeFigureOut">
               <a:rPr lang="en-US" smtClean="0"/>
-              <a:t>11/14/2019</a:t>
+              <a:t>11/25/2019</a:t>
             </a:fld>
             <a:endParaRPr lang="en-US"/>
           </a:p>
@@ -1940,7 +1940,7 @@
           <a:p>
             <a:fld id="{819FB65F-77A9-44EE-854A-5630BF17D415}" type="datetimeFigureOut">
               <a:rPr lang="en-US" smtClean="0"/>
-              <a:t>11/14/2019</a:t>
+              <a:t>11/25/2019</a:t>
             </a:fld>
             <a:endParaRPr lang="en-US"/>
           </a:p>
@@ -2307,7 +2307,7 @@
           <a:p>
             <a:fld id="{819FB65F-77A9-44EE-854A-5630BF17D415}" type="datetimeFigureOut">
               <a:rPr lang="en-US" smtClean="0"/>
-              <a:t>11/14/2019</a:t>
+              <a:t>11/25/2019</a:t>
             </a:fld>
             <a:endParaRPr lang="en-US"/>
           </a:p>
@@ -2425,7 +2425,7 @@
           <a:p>
             <a:fld id="{819FB65F-77A9-44EE-854A-5630BF17D415}" type="datetimeFigureOut">
               <a:rPr lang="en-US" smtClean="0"/>
-              <a:t>11/14/2019</a:t>
+              <a:t>11/25/2019</a:t>
             </a:fld>
             <a:endParaRPr lang="en-US"/>
           </a:p>
@@ -2520,7 +2520,7 @@
           <a:p>
             <a:fld id="{819FB65F-77A9-44EE-854A-5630BF17D415}" type="datetimeFigureOut">
               <a:rPr lang="en-US" smtClean="0"/>
-              <a:t>11/14/2019</a:t>
+              <a:t>11/25/2019</a:t>
             </a:fld>
             <a:endParaRPr lang="en-US"/>
           </a:p>
@@ -2797,7 +2797,7 @@
           <a:p>
             <a:fld id="{819FB65F-77A9-44EE-854A-5630BF17D415}" type="datetimeFigureOut">
               <a:rPr lang="en-US" smtClean="0"/>
-              <a:t>11/14/2019</a:t>
+              <a:t>11/25/2019</a:t>
             </a:fld>
             <a:endParaRPr lang="en-US"/>
           </a:p>
@@ -3054,7 +3054,7 @@
           <a:p>
             <a:fld id="{819FB65F-77A9-44EE-854A-5630BF17D415}" type="datetimeFigureOut">
               <a:rPr lang="en-US" smtClean="0"/>
-              <a:t>11/14/2019</a:t>
+              <a:t>11/25/2019</a:t>
             </a:fld>
             <a:endParaRPr lang="en-US"/>
           </a:p>
@@ -3267,7 +3267,7 @@
           <a:p>
             <a:fld id="{819FB65F-77A9-44EE-854A-5630BF17D415}" type="datetimeFigureOut">
               <a:rPr lang="en-US" smtClean="0"/>
-              <a:t>11/14/2019</a:t>
+              <a:t>11/25/2019</a:t>
             </a:fld>
             <a:endParaRPr lang="en-US"/>
           </a:p>
@@ -4762,7 +4762,7 @@
                 <a:latin typeface="Arial" panose="020B0604020202020204" pitchFamily="34" charset="0"/>
                 <a:cs typeface="Arial" panose="020B0604020202020204" pitchFamily="34" charset="0"/>
               </a:rPr>
-              <a:t>Lag regression of (a) adiabatic and (b) diabatic balance terms onto the change in WWV.</a:t>
+              <a:t>Lag regression of (a) adiabatic and (b) diabatic balance terms onto the N34 index.</a:t>
             </a:r>
           </a:p>
         </p:txBody>
@@ -5537,6 +5537,76 @@
           </p:pic>
         </mc:Fallback>
       </mc:AlternateContent>
+      <p:pic>
+        <p:nvPicPr>
+          <p:cNvPr id="32" name="Picture 31">
+            <a:extLst>
+              <a:ext uri="{FF2B5EF4-FFF2-40B4-BE49-F238E27FC236}">
+                <a16:creationId xmlns:a16="http://schemas.microsoft.com/office/drawing/2014/main" id="{9A858BA7-BD69-4B08-B6DD-27C51A3AB09F}"/>
+              </a:ext>
+            </a:extLst>
+          </p:cNvPr>
+          <p:cNvPicPr>
+            <a:picLocks noChangeAspect="1"/>
+          </p:cNvPicPr>
+          <p:nvPr/>
+        </p:nvPicPr>
+        <p:blipFill rotWithShape="1">
+          <a:blip r:embed="rId7">
+            <a:extLst>
+              <a:ext uri="{28A0092B-C50C-407E-A947-70E740481C1C}">
+                <a14:useLocalDpi xmlns:a14="http://schemas.microsoft.com/office/drawing/2010/main" val="0"/>
+              </a:ext>
+            </a:extLst>
+          </a:blip>
+          <a:srcRect l="14310" t="60766" r="74465" b="32815"/>
+          <a:stretch/>
+        </p:blipFill>
+        <p:spPr>
+          <a:xfrm>
+            <a:off x="17383750" y="13978026"/>
+            <a:ext cx="1600200" cy="403662"/>
+          </a:xfrm>
+          <a:prstGeom prst="rect">
+            <a:avLst/>
+          </a:prstGeom>
+        </p:spPr>
+      </p:pic>
+      <p:pic>
+        <p:nvPicPr>
+          <p:cNvPr id="34" name="Picture 33">
+            <a:extLst>
+              <a:ext uri="{FF2B5EF4-FFF2-40B4-BE49-F238E27FC236}">
+                <a16:creationId xmlns:a16="http://schemas.microsoft.com/office/drawing/2014/main" id="{6C528F9D-56CC-4C32-A161-6AA219B0DC6C}"/>
+              </a:ext>
+            </a:extLst>
+          </p:cNvPr>
+          <p:cNvPicPr>
+            <a:picLocks noChangeAspect="1"/>
+          </p:cNvPicPr>
+          <p:nvPr/>
+        </p:nvPicPr>
+        <p:blipFill rotWithShape="1">
+          <a:blip r:embed="rId8">
+            <a:extLst>
+              <a:ext uri="{28A0092B-C50C-407E-A947-70E740481C1C}">
+                <a14:useLocalDpi xmlns:a14="http://schemas.microsoft.com/office/drawing/2010/main" val="0"/>
+              </a:ext>
+            </a:extLst>
+          </a:blip>
+          <a:srcRect l="15064" t="51720" r="75435" b="42999"/>
+          <a:stretch/>
+        </p:blipFill>
+        <p:spPr>
+          <a:xfrm>
+            <a:off x="2675934" y="13978026"/>
+            <a:ext cx="1354305" cy="332036"/>
+          </a:xfrm>
+          <a:prstGeom prst="rect">
+            <a:avLst/>
+          </a:prstGeom>
+        </p:spPr>
+      </p:pic>
     </p:spTree>
     <p:extLst>
       <p:ext uri="{BB962C8B-B14F-4D97-AF65-F5344CB8AC3E}">
@@ -6334,21 +6404,6 @@
 </file>
 
 <file path=customXml/item1.xml><?xml version="1.0" encoding="utf-8"?>
-<p:properties xmlns:p="http://schemas.microsoft.com/office/2006/metadata/properties" xmlns:xsi="http://www.w3.org/2001/XMLSchema-instance" xmlns:pc="http://schemas.microsoft.com/office/infopath/2007/PartnerControls">
-  <documentManagement/>
-</p:properties>
-</file>
-
-<file path=customXml/item2.xml><?xml version="1.0" encoding="utf-8"?>
-<?mso-contentType ?>
-<FormTemplates xmlns="http://schemas.microsoft.com/sharepoint/v3/contenttype/forms">
-  <Display>DocumentLibraryForm</Display>
-  <Edit>DocumentLibraryForm</Edit>
-  <New>DocumentLibraryForm</New>
-</FormTemplates>
-</file>
-
-<file path=customXml/item3.xml><?xml version="1.0" encoding="utf-8"?>
 <ct:contentTypeSchema xmlns:ct="http://schemas.microsoft.com/office/2006/metadata/contentType" xmlns:ma="http://schemas.microsoft.com/office/2006/metadata/properties/metaAttributes" ct:_="" ma:_="" ma:contentTypeName="Document" ma:contentTypeID="0x01010055EF6BBE312FEB4D82AAE6E17BDA5126" ma:contentTypeVersion="6" ma:contentTypeDescription="Create a new document." ma:contentTypeScope="" ma:versionID="1c9ff379a8556a6d726efb775621987a">
   <xsd:schema xmlns:xsd="http://www.w3.org/2001/XMLSchema" xmlns:xs="http://www.w3.org/2001/XMLSchema" xmlns:p="http://schemas.microsoft.com/office/2006/metadata/properties" xmlns:ns3="55b9330c-b65e-4278-87f6-c99b13caa9a6" targetNamespace="http://schemas.microsoft.com/office/2006/metadata/properties" ma:root="true" ma:fieldsID="b8a364a476f1d9203dc5bd6398e56b59" ns3:_="">
     <xsd:import namespace="55b9330c-b65e-4278-87f6-c99b13caa9a6"/>
@@ -6506,31 +6561,22 @@
 </ct:contentTypeSchema>
 </file>
 
-<file path=customXml/itemProps1.xml><?xml version="1.0" encoding="utf-8"?>
-<ds:datastoreItem xmlns:ds="http://schemas.openxmlformats.org/officeDocument/2006/customXml" ds:itemID="{726E48BB-F264-4B8D-AFB3-ED7A7FB3EA56}">
-  <ds:schemaRefs>
-    <ds:schemaRef ds:uri="http://purl.org/dc/dcmitype/"/>
-    <ds:schemaRef ds:uri="http://schemas.openxmlformats.org/package/2006/metadata/core-properties"/>
-    <ds:schemaRef ds:uri="http://www.w3.org/XML/1998/namespace"/>
-    <ds:schemaRef ds:uri="http://schemas.microsoft.com/office/2006/documentManagement/types"/>
-    <ds:schemaRef ds:uri="55b9330c-b65e-4278-87f6-c99b13caa9a6"/>
-    <ds:schemaRef ds:uri="http://purl.org/dc/terms/"/>
-    <ds:schemaRef ds:uri="http://schemas.microsoft.com/office/infopath/2007/PartnerControls"/>
-    <ds:schemaRef ds:uri="http://schemas.microsoft.com/office/2006/metadata/properties"/>
-    <ds:schemaRef ds:uri="http://purl.org/dc/elements/1.1/"/>
-  </ds:schemaRefs>
-</ds:datastoreItem>
+<file path=customXml/item2.xml><?xml version="1.0" encoding="utf-8"?>
+<?mso-contentType ?>
+<FormTemplates xmlns="http://schemas.microsoft.com/sharepoint/v3/contenttype/forms">
+  <Display>DocumentLibraryForm</Display>
+  <Edit>DocumentLibraryForm</Edit>
+  <New>DocumentLibraryForm</New>
+</FormTemplates>
 </file>
 
-<file path=customXml/itemProps2.xml><?xml version="1.0" encoding="utf-8"?>
-<ds:datastoreItem xmlns:ds="http://schemas.openxmlformats.org/officeDocument/2006/customXml" ds:itemID="{E5A3562A-7909-4CE7-AB00-E98362C1F4FB}">
-  <ds:schemaRefs>
-    <ds:schemaRef ds:uri="http://schemas.microsoft.com/sharepoint/v3/contenttype/forms"/>
-  </ds:schemaRefs>
-</ds:datastoreItem>
+<file path=customXml/item3.xml><?xml version="1.0" encoding="utf-8"?>
+<p:properties xmlns:p="http://schemas.microsoft.com/office/2006/metadata/properties" xmlns:xsi="http://www.w3.org/2001/XMLSchema-instance" xmlns:pc="http://schemas.microsoft.com/office/infopath/2007/PartnerControls">
+  <documentManagement/>
+</p:properties>
 </file>
 
-<file path=customXml/itemProps3.xml><?xml version="1.0" encoding="utf-8"?>
+<file path=customXml/itemProps1.xml><?xml version="1.0" encoding="utf-8"?>
 <ds:datastoreItem xmlns:ds="http://schemas.openxmlformats.org/officeDocument/2006/customXml" ds:itemID="{AD33B81E-0435-4EEA-BA2F-61D5E68D7B6F}">
   <ds:schemaRefs>
     <ds:schemaRef ds:uri="http://schemas.microsoft.com/office/2006/metadata/contentType"/>
@@ -6546,4 +6592,28 @@
     <ds:schemaRef ds:uri="http://schemas.microsoft.com/internal/obd"/>
   </ds:schemaRefs>
 </ds:datastoreItem>
+</file>
+
+<file path=customXml/itemProps2.xml><?xml version="1.0" encoding="utf-8"?>
+<ds:datastoreItem xmlns:ds="http://schemas.openxmlformats.org/officeDocument/2006/customXml" ds:itemID="{E5A3562A-7909-4CE7-AB00-E98362C1F4FB}">
+  <ds:schemaRefs>
+    <ds:schemaRef ds:uri="http://schemas.microsoft.com/sharepoint/v3/contenttype/forms"/>
+  </ds:schemaRefs>
+</ds:datastoreItem>
+</file>
+
+<file path=customXml/itemProps3.xml><?xml version="1.0" encoding="utf-8"?>
+<ds:datastoreItem xmlns:ds="http://schemas.openxmlformats.org/officeDocument/2006/customXml" ds:itemID="{726E48BB-F264-4B8D-AFB3-ED7A7FB3EA56}">
+  <ds:schemaRefs>
+    <ds:schemaRef ds:uri="http://purl.org/dc/elements/1.1/"/>
+    <ds:schemaRef ds:uri="55b9330c-b65e-4278-87f6-c99b13caa9a6"/>
+    <ds:schemaRef ds:uri="http://www.w3.org/XML/1998/namespace"/>
+    <ds:schemaRef ds:uri="http://schemas.microsoft.com/office/2006/documentManagement/types"/>
+    <ds:schemaRef ds:uri="http://schemas.microsoft.com/office/infopath/2007/PartnerControls"/>
+    <ds:schemaRef ds:uri="http://schemas.openxmlformats.org/package/2006/metadata/core-properties"/>
+    <ds:schemaRef ds:uri="http://schemas.microsoft.com/office/2006/metadata/properties"/>
+    <ds:schemaRef ds:uri="http://purl.org/dc/dcmitype/"/>
+    <ds:schemaRef ds:uri="http://purl.org/dc/terms/"/>
+  </ds:schemaRefs>
+</ds:datastoreItem>
 </file>
</xml_diff>